<commit_message>
Testet kontrollsystem på simulering
</commit_message>
<xml_diff>
--- a/Presentasjon/presentasjon for servi 18.03.25.pptx
+++ b/Presentasjon/presentasjon for servi 18.03.25.pptx
@@ -110,6 +110,11 @@
       </a:defRPr>
     </a:lvl9pPr>
   </p:defaultTextStyle>
+  <p:extLst>
+    <p:ext uri="{EFAFB233-063F-42B5-8137-9DF3F51BA10A}">
+      <p15:sldGuideLst xmlns:p15="http://schemas.microsoft.com/office/powerpoint/2012/main"/>
+    </p:ext>
+  </p:extLst>
 </p:presentation>
 </file>
 
@@ -3601,230 +3606,38 @@
               </a:p>
               <a:p>
                 <a:r>
-                  <a:rPr lang="en-GB" dirty="0"/>
-                  <a:t>Ved bruk </a:t>
+                  <a:rPr lang="nb-NO" noProof="0" dirty="0"/>
+                  <a:t>Ved bruk av trykkompensator får man et bestemt </a:t>
                 </a:r>
                 <a:r>
-                  <a:rPr lang="en-GB" dirty="0" err="1"/>
-                  <a:t>av</a:t>
+                  <a:rPr lang="nb-NO" noProof="0" dirty="0" err="1"/>
+                  <a:t>flow</a:t>
                 </a:r>
                 <a:r>
-                  <a:rPr lang="en-GB" dirty="0"/>
-                  <a:t> </a:t>
-                </a:r>
-                <a:r>
-                  <a:rPr lang="en-GB" dirty="0" err="1"/>
-                  <a:t>trykkompensator</a:t>
-                </a:r>
-                <a:r>
-                  <a:rPr lang="en-GB" dirty="0"/>
-                  <a:t> </a:t>
-                </a:r>
-                <a:r>
-                  <a:rPr lang="en-GB" dirty="0" err="1"/>
-                  <a:t>får</a:t>
-                </a:r>
-                <a:r>
-                  <a:rPr lang="en-GB" dirty="0"/>
-                  <a:t> man et </a:t>
-                </a:r>
-                <a:r>
-                  <a:rPr lang="en-GB" dirty="0" err="1"/>
-                  <a:t>bestemt</a:t>
-                </a:r>
-                <a:r>
-                  <a:rPr lang="en-GB" dirty="0"/>
-                  <a:t> flow </a:t>
-                </a:r>
-                <a:r>
-                  <a:rPr lang="en-GB" dirty="0" err="1"/>
-                  <a:t>til</a:t>
-                </a:r>
-                <a:r>
-                  <a:rPr lang="en-GB" dirty="0"/>
-                  <a:t> </a:t>
-                </a:r>
-                <a:r>
-                  <a:rPr lang="en-GB" dirty="0" err="1"/>
-                  <a:t>en</a:t>
-                </a:r>
-                <a:r>
-                  <a:rPr lang="en-GB" dirty="0"/>
-                  <a:t> </a:t>
-                </a:r>
-                <a:r>
-                  <a:rPr lang="en-GB" dirty="0" err="1"/>
-                  <a:t>bestemt</a:t>
-                </a:r>
-                <a:r>
-                  <a:rPr lang="en-GB" dirty="0"/>
-                  <a:t> </a:t>
-                </a:r>
-                <a:r>
-                  <a:rPr lang="en-GB" dirty="0" err="1"/>
-                  <a:t>åpning</a:t>
-                </a:r>
-                <a:r>
-                  <a:rPr lang="en-GB" dirty="0"/>
-                  <a:t> </a:t>
-                </a:r>
-                <a:r>
-                  <a:rPr lang="en-GB" dirty="0" err="1"/>
-                  <a:t>av</a:t>
-                </a:r>
-                <a:r>
-                  <a:rPr lang="en-GB" dirty="0"/>
-                  <a:t> </a:t>
-                </a:r>
-                <a:r>
-                  <a:rPr lang="en-GB" dirty="0" err="1"/>
-                  <a:t>retningsventilen</a:t>
-                </a:r>
-                <a:r>
-                  <a:rPr lang="en-GB" dirty="0"/>
-                  <a:t>.</a:t>
+                  <a:rPr lang="nb-NO" noProof="0" dirty="0"/>
+                  <a:t> til en bestemt åpning av retningsventilen.</a:t>
                 </a:r>
               </a:p>
               <a:p>
                 <a:r>
-                  <a:rPr lang="en-GB" dirty="0"/>
-                  <a:t>Siden </a:t>
+                  <a:rPr lang="nb-NO" noProof="0" dirty="0"/>
+                  <a:t>Siden trykkompensatoren fjernes trenger man å måle trykkene på hver side av ventilen, og bruke </a:t>
                 </a:r>
                 <a:r>
-                  <a:rPr lang="en-GB" dirty="0" err="1"/>
-                  <a:t>trykkompensatoren</a:t>
-                </a:r>
-                <a:r>
-                  <a:rPr lang="en-GB" dirty="0"/>
-                  <a:t> </a:t>
-                </a:r>
-                <a:r>
-                  <a:rPr lang="en-GB" dirty="0" err="1"/>
-                  <a:t>fjernes</a:t>
-                </a:r>
-                <a:r>
-                  <a:rPr lang="en-GB" dirty="0"/>
-                  <a:t> </a:t>
-                </a:r>
-                <a:r>
-                  <a:rPr lang="en-GB" dirty="0" err="1"/>
-                  <a:t>trenger</a:t>
-                </a:r>
-                <a:r>
-                  <a:rPr lang="en-GB" dirty="0"/>
-                  <a:t> man å </a:t>
-                </a:r>
-                <a:r>
-                  <a:rPr lang="en-GB" dirty="0" err="1"/>
-                  <a:t>måle</a:t>
-                </a:r>
-                <a:r>
-                  <a:rPr lang="en-GB" dirty="0"/>
-                  <a:t> </a:t>
-                </a:r>
-                <a:r>
-                  <a:rPr lang="en-GB" dirty="0" err="1"/>
-                  <a:t>trykkene</a:t>
-                </a:r>
-                <a:r>
-                  <a:rPr lang="en-GB" dirty="0"/>
-                  <a:t> </a:t>
-                </a:r>
-                <a:r>
-                  <a:rPr lang="en-GB" dirty="0" err="1"/>
-                  <a:t>på</a:t>
-                </a:r>
-                <a:r>
-                  <a:rPr lang="en-GB" dirty="0"/>
-                  <a:t> </a:t>
-                </a:r>
-                <a:r>
-                  <a:rPr lang="en-GB" dirty="0" err="1"/>
-                  <a:t>hver</a:t>
-                </a:r>
-                <a:r>
-                  <a:rPr lang="en-GB" dirty="0"/>
-                  <a:t> side </a:t>
-                </a:r>
-                <a:r>
-                  <a:rPr lang="en-GB" dirty="0" err="1"/>
-                  <a:t>av</a:t>
-                </a:r>
-                <a:r>
-                  <a:rPr lang="en-GB" dirty="0"/>
-                  <a:t> </a:t>
-                </a:r>
-                <a:r>
-                  <a:rPr lang="en-GB" dirty="0" err="1"/>
-                  <a:t>ventilen</a:t>
-                </a:r>
-                <a:r>
-                  <a:rPr lang="en-GB" dirty="0"/>
-                  <a:t>, </a:t>
-                </a:r>
-                <a:r>
-                  <a:rPr lang="en-GB" dirty="0" err="1"/>
-                  <a:t>og</a:t>
-                </a:r>
-                <a:r>
-                  <a:rPr lang="en-GB" dirty="0"/>
-                  <a:t> </a:t>
-                </a:r>
-                <a:r>
-                  <a:rPr lang="en-GB" dirty="0" err="1"/>
-                  <a:t>bruke</a:t>
-                </a:r>
-                <a:r>
-                  <a:rPr lang="en-GB" dirty="0"/>
-                  <a:t> </a:t>
-                </a:r>
-                <a:r>
-                  <a:rPr lang="en-GB" dirty="0" err="1"/>
+                  <a:rPr lang="nb-NO" noProof="0" dirty="0" err="1"/>
                   <a:t>strupningsformelen</a:t>
                 </a:r>
                 <a:r>
-                  <a:rPr lang="en-GB" dirty="0"/>
-                  <a:t> </a:t>
+                  <a:rPr lang="nb-NO" noProof="0" dirty="0"/>
+                  <a:t> til å regne ut </a:t>
                 </a:r>
                 <a:r>
-                  <a:rPr lang="en-GB" dirty="0" err="1"/>
-                  <a:t>til</a:t>
+                  <a:rPr lang="nb-NO" noProof="0" dirty="0" err="1"/>
+                  <a:t>flow</a:t>
                 </a:r>
                 <a:r>
-                  <a:rPr lang="en-GB" dirty="0"/>
-                  <a:t> å </a:t>
-                </a:r>
-                <a:r>
-                  <a:rPr lang="en-GB" dirty="0" err="1"/>
-                  <a:t>regne</a:t>
-                </a:r>
-                <a:r>
-                  <a:rPr lang="en-GB" dirty="0"/>
-                  <a:t> </a:t>
-                </a:r>
-                <a:r>
-                  <a:rPr lang="en-GB" dirty="0" err="1"/>
-                  <a:t>ut</a:t>
-                </a:r>
-                <a:r>
-                  <a:rPr lang="en-GB" dirty="0"/>
-                  <a:t> flow </a:t>
-                </a:r>
-                <a:r>
-                  <a:rPr lang="en-GB" dirty="0" err="1"/>
-                  <a:t>gjennom</a:t>
-                </a:r>
-                <a:r>
-                  <a:rPr lang="en-GB" dirty="0"/>
-                  <a:t> </a:t>
-                </a:r>
-                <a:r>
-                  <a:rPr lang="en-GB" dirty="0" err="1"/>
-                  <a:t>ventilen</a:t>
-                </a:r>
-                <a:r>
-                  <a:rPr lang="en-GB" dirty="0"/>
-                  <a:t>.</a:t>
+                  <a:rPr lang="nb-NO" noProof="0" dirty="0"/>
+                  <a:t> gjennom ventilen.</a:t>
                 </a:r>
               </a:p>
             </p:txBody>
@@ -3851,7 +3664,7 @@
               <a:blipFill>
                 <a:blip r:embed="rId2"/>
                 <a:stretch>
-                  <a:fillRect l="-1043" t="-2381"/>
+                  <a:fillRect l="-1043" t="-2381" r="-116"/>
                 </a:stretch>
               </a:blipFill>
             </p:spPr>
@@ -3860,7 +3673,7 @@
               <a:lstStyle/>
               <a:p>
                 <a:r>
-                  <a:rPr lang="en-GB">
+                  <a:rPr lang="nb-NO">
                     <a:noFill/>
                   </a:rPr>
                   <a:t> </a:t>
@@ -4926,8 +4739,8 @@
             </a:fontRef>
           </p:style>
         </p:cxnSp>
-        <mc:AlternateContent xmlns:mc="http://schemas.openxmlformats.org/markup-compatibility/2006">
-          <mc:Choice xmlns:a14="http://schemas.microsoft.com/office/drawing/2010/main" Requires="a14">
+        <mc:AlternateContent xmlns:mc="http://schemas.openxmlformats.org/markup-compatibility/2006" xmlns:a14="http://schemas.microsoft.com/office/drawing/2010/main">
+          <mc:Choice Requires="a14">
             <p:sp>
               <p:nvSpPr>
                 <p:cNvPr id="33" name="TextBox 32">
@@ -4956,6 +4769,7 @@
                 </a:bodyPr>
                 <a:lstStyle/>
                 <a:p>
+                  <a:pPr/>
                   <a14:m>
                     <m:oMathPara xmlns:m="http://schemas.openxmlformats.org/officeDocument/2006/math">
                       <m:oMathParaPr>
@@ -4995,7 +4809,7 @@
               </p:txBody>
             </p:sp>
           </mc:Choice>
-          <mc:Fallback>
+          <mc:Fallback xmlns="">
             <p:sp>
               <p:nvSpPr>
                 <p:cNvPr id="33" name="TextBox 32">
@@ -5040,8 +4854,8 @@
             </p:sp>
           </mc:Fallback>
         </mc:AlternateContent>
-        <mc:AlternateContent xmlns:mc="http://schemas.openxmlformats.org/markup-compatibility/2006">
-          <mc:Choice xmlns:a14="http://schemas.microsoft.com/office/drawing/2010/main" Requires="a14">
+        <mc:AlternateContent xmlns:mc="http://schemas.openxmlformats.org/markup-compatibility/2006" xmlns:a14="http://schemas.microsoft.com/office/drawing/2010/main">
+          <mc:Choice Requires="a14">
             <p:sp>
               <p:nvSpPr>
                 <p:cNvPr id="34" name="TextBox 33">
@@ -5070,6 +4884,7 @@
                 </a:bodyPr>
                 <a:lstStyle/>
                 <a:p>
+                  <a:pPr/>
                   <a14:m>
                     <m:oMathPara xmlns:m="http://schemas.openxmlformats.org/officeDocument/2006/math">
                       <m:oMathParaPr>
@@ -5090,7 +4905,7 @@
               </p:txBody>
             </p:sp>
           </mc:Choice>
-          <mc:Fallback>
+          <mc:Fallback xmlns="">
             <p:sp>
               <p:nvSpPr>
                 <p:cNvPr id="34" name="TextBox 33">
@@ -5135,8 +4950,8 @@
             </p:sp>
           </mc:Fallback>
         </mc:AlternateContent>
-        <mc:AlternateContent xmlns:mc="http://schemas.openxmlformats.org/markup-compatibility/2006">
-          <mc:Choice xmlns:a14="http://schemas.microsoft.com/office/drawing/2010/main" Requires="a14">
+        <mc:AlternateContent xmlns:mc="http://schemas.openxmlformats.org/markup-compatibility/2006" xmlns:a14="http://schemas.microsoft.com/office/drawing/2010/main">
+          <mc:Choice Requires="a14">
             <p:sp>
               <p:nvSpPr>
                 <p:cNvPr id="53" name="TextBox 52">
@@ -5165,6 +4980,7 @@
                 </a:bodyPr>
                 <a:lstStyle/>
                 <a:p>
+                  <a:pPr/>
                   <a14:m>
                     <m:oMathPara xmlns:m="http://schemas.openxmlformats.org/officeDocument/2006/math">
                       <m:oMathParaPr>
@@ -5204,7 +5020,7 @@
               </p:txBody>
             </p:sp>
           </mc:Choice>
-          <mc:Fallback>
+          <mc:Fallback xmlns="">
             <p:sp>
               <p:nvSpPr>
                 <p:cNvPr id="53" name="TextBox 52">
@@ -5249,8 +5065,8 @@
             </p:sp>
           </mc:Fallback>
         </mc:AlternateContent>
-        <mc:AlternateContent xmlns:mc="http://schemas.openxmlformats.org/markup-compatibility/2006">
-          <mc:Choice xmlns:a14="http://schemas.microsoft.com/office/drawing/2010/main" Requires="a14">
+        <mc:AlternateContent xmlns:mc="http://schemas.openxmlformats.org/markup-compatibility/2006" xmlns:a14="http://schemas.microsoft.com/office/drawing/2010/main">
+          <mc:Choice Requires="a14">
             <p:sp>
               <p:nvSpPr>
                 <p:cNvPr id="56" name="TextBox 55">
@@ -5279,6 +5095,7 @@
                 </a:bodyPr>
                 <a:lstStyle/>
                 <a:p>
+                  <a:pPr/>
                   <a14:m>
                     <m:oMathPara xmlns:m="http://schemas.openxmlformats.org/officeDocument/2006/math">
                       <m:oMathParaPr>
@@ -5318,7 +5135,7 @@
               </p:txBody>
             </p:sp>
           </mc:Choice>
-          <mc:Fallback>
+          <mc:Fallback xmlns="">
             <p:sp>
               <p:nvSpPr>
                 <p:cNvPr id="56" name="TextBox 55">
@@ -5363,8 +5180,8 @@
             </p:sp>
           </mc:Fallback>
         </mc:AlternateContent>
-        <mc:AlternateContent xmlns:mc="http://schemas.openxmlformats.org/markup-compatibility/2006">
-          <mc:Choice xmlns:a14="http://schemas.microsoft.com/office/drawing/2010/main" Requires="a14">
+        <mc:AlternateContent xmlns:mc="http://schemas.openxmlformats.org/markup-compatibility/2006" xmlns:a14="http://schemas.microsoft.com/office/drawing/2010/main">
+          <mc:Choice Requires="a14">
             <p:sp>
               <p:nvSpPr>
                 <p:cNvPr id="57" name="TextBox 56">
@@ -5393,6 +5210,7 @@
                 </a:bodyPr>
                 <a:lstStyle/>
                 <a:p>
+                  <a:pPr/>
                   <a14:m>
                     <m:oMathPara xmlns:m="http://schemas.openxmlformats.org/officeDocument/2006/math">
                       <m:oMathParaPr>
@@ -5432,7 +5250,7 @@
               </p:txBody>
             </p:sp>
           </mc:Choice>
-          <mc:Fallback>
+          <mc:Fallback xmlns="">
             <p:sp>
               <p:nvSpPr>
                 <p:cNvPr id="57" name="TextBox 56">
@@ -5498,8 +5316,8 @@
             <a:chExt cx="5177955" cy="3865968"/>
           </a:xfrm>
         </p:grpSpPr>
-        <mc:AlternateContent xmlns:mc="http://schemas.openxmlformats.org/markup-compatibility/2006">
-          <mc:Choice xmlns:a14="http://schemas.microsoft.com/office/drawing/2010/main" Requires="a14">
+        <mc:AlternateContent xmlns:mc="http://schemas.openxmlformats.org/markup-compatibility/2006" xmlns:a14="http://schemas.microsoft.com/office/drawing/2010/main">
+          <mc:Choice Requires="a14">
             <p:sp>
               <p:nvSpPr>
                 <p:cNvPr id="75" name="TextBox 74">
@@ -5528,6 +5346,7 @@
                 </a:bodyPr>
                 <a:lstStyle/>
                 <a:p>
+                  <a:pPr/>
                   <a14:m>
                     <m:oMathPara xmlns:m="http://schemas.openxmlformats.org/officeDocument/2006/math">
                       <m:oMathParaPr>
@@ -5629,7 +5448,7 @@
               </p:txBody>
             </p:sp>
           </mc:Choice>
-          <mc:Fallback>
+          <mc:Fallback xmlns="">
             <p:sp>
               <p:nvSpPr>
                 <p:cNvPr id="75" name="TextBox 74">
@@ -5674,8 +5493,8 @@
             </p:sp>
           </mc:Fallback>
         </mc:AlternateContent>
-        <mc:AlternateContent xmlns:mc="http://schemas.openxmlformats.org/markup-compatibility/2006">
-          <mc:Choice xmlns:a14="http://schemas.microsoft.com/office/drawing/2010/main" Requires="a14">
+        <mc:AlternateContent xmlns:mc="http://schemas.openxmlformats.org/markup-compatibility/2006" xmlns:a14="http://schemas.microsoft.com/office/drawing/2010/main">
+          <mc:Choice Requires="a14">
             <p:sp>
               <p:nvSpPr>
                 <p:cNvPr id="76" name="TextBox 75">
@@ -5704,6 +5523,7 @@
                 </a:bodyPr>
                 <a:lstStyle/>
                 <a:p>
+                  <a:pPr/>
                   <a14:m>
                     <m:oMathPara xmlns:m="http://schemas.openxmlformats.org/officeDocument/2006/math">
                       <m:oMathParaPr>
@@ -5823,7 +5643,7 @@
               </p:txBody>
             </p:sp>
           </mc:Choice>
-          <mc:Fallback>
+          <mc:Fallback xmlns="">
             <p:sp>
               <p:nvSpPr>
                 <p:cNvPr id="76" name="TextBox 75">
@@ -5868,8 +5688,8 @@
             </p:sp>
           </mc:Fallback>
         </mc:AlternateContent>
-        <mc:AlternateContent xmlns:mc="http://schemas.openxmlformats.org/markup-compatibility/2006">
-          <mc:Choice xmlns:a14="http://schemas.microsoft.com/office/drawing/2010/main" Requires="a14">
+        <mc:AlternateContent xmlns:mc="http://schemas.openxmlformats.org/markup-compatibility/2006" xmlns:a14="http://schemas.microsoft.com/office/drawing/2010/main">
+          <mc:Choice Requires="a14">
             <p:sp>
               <p:nvSpPr>
                 <p:cNvPr id="77" name="TextBox 76">
@@ -5898,6 +5718,7 @@
                 </a:bodyPr>
                 <a:lstStyle/>
                 <a:p>
+                  <a:pPr/>
                   <a14:m>
                     <m:oMathPara xmlns:m="http://schemas.openxmlformats.org/officeDocument/2006/math">
                       <m:oMathParaPr>
@@ -6202,7 +6023,7 @@
               </p:txBody>
             </p:sp>
           </mc:Choice>
-          <mc:Fallback>
+          <mc:Fallback xmlns="">
             <p:sp>
               <p:nvSpPr>
                 <p:cNvPr id="77" name="TextBox 76">
@@ -6247,8 +6068,8 @@
             </p:sp>
           </mc:Fallback>
         </mc:AlternateContent>
-        <mc:AlternateContent xmlns:mc="http://schemas.openxmlformats.org/markup-compatibility/2006">
-          <mc:Choice xmlns:a14="http://schemas.microsoft.com/office/drawing/2010/main" Requires="a14">
+        <mc:AlternateContent xmlns:mc="http://schemas.openxmlformats.org/markup-compatibility/2006" xmlns:a14="http://schemas.microsoft.com/office/drawing/2010/main">
+          <mc:Choice Requires="a14">
             <p:sp>
               <p:nvSpPr>
                 <p:cNvPr id="78" name="TextBox 77">
@@ -6277,6 +6098,7 @@
                 </a:bodyPr>
                 <a:lstStyle/>
                 <a:p>
+                  <a:pPr/>
                   <a14:m>
                     <m:oMathPara xmlns:m="http://schemas.openxmlformats.org/officeDocument/2006/math">
                       <m:oMathParaPr>
@@ -6469,7 +6291,7 @@
               </p:txBody>
             </p:sp>
           </mc:Choice>
-          <mc:Fallback>
+          <mc:Fallback xmlns="">
             <p:sp>
               <p:nvSpPr>
                 <p:cNvPr id="78" name="TextBox 77">
@@ -6514,8 +6336,8 @@
             </p:sp>
           </mc:Fallback>
         </mc:AlternateContent>
-        <mc:AlternateContent xmlns:mc="http://schemas.openxmlformats.org/markup-compatibility/2006">
-          <mc:Choice xmlns:a14="http://schemas.microsoft.com/office/drawing/2010/main" Requires="a14">
+        <mc:AlternateContent xmlns:mc="http://schemas.openxmlformats.org/markup-compatibility/2006" xmlns:a14="http://schemas.microsoft.com/office/drawing/2010/main">
+          <mc:Choice Requires="a14">
             <p:sp>
               <p:nvSpPr>
                 <p:cNvPr id="79" name="TextBox 78">
@@ -6544,6 +6366,7 @@
                 </a:bodyPr>
                 <a:lstStyle/>
                 <a:p>
+                  <a:pPr/>
                   <a14:m>
                     <m:oMathPara xmlns:m="http://schemas.openxmlformats.org/officeDocument/2006/math">
                       <m:oMathParaPr>
@@ -6729,7 +6552,7 @@
               </p:txBody>
             </p:sp>
           </mc:Choice>
-          <mc:Fallback>
+          <mc:Fallback xmlns="">
             <p:sp>
               <p:nvSpPr>
                 <p:cNvPr id="79" name="TextBox 78">
@@ -6774,8 +6597,8 @@
             </p:sp>
           </mc:Fallback>
         </mc:AlternateContent>
-        <mc:AlternateContent xmlns:mc="http://schemas.openxmlformats.org/markup-compatibility/2006">
-          <mc:Choice xmlns:a14="http://schemas.microsoft.com/office/drawing/2010/main" Requires="a14">
+        <mc:AlternateContent xmlns:mc="http://schemas.openxmlformats.org/markup-compatibility/2006" xmlns:a14="http://schemas.microsoft.com/office/drawing/2010/main">
+          <mc:Choice Requires="a14">
             <p:sp>
               <p:nvSpPr>
                 <p:cNvPr id="80" name="TextBox 79">
@@ -6804,6 +6627,7 @@
                 </a:bodyPr>
                 <a:lstStyle/>
                 <a:p>
+                  <a:pPr/>
                   <a14:m>
                     <m:oMathPara xmlns:m="http://schemas.openxmlformats.org/officeDocument/2006/math">
                       <m:oMathParaPr>
@@ -6927,7 +6751,7 @@
               </p:txBody>
             </p:sp>
           </mc:Choice>
-          <mc:Fallback>
+          <mc:Fallback xmlns="">
             <p:sp>
               <p:nvSpPr>
                 <p:cNvPr id="80" name="TextBox 79">
@@ -7020,8 +6844,8 @@
           </a:fontRef>
         </p:style>
       </p:cxnSp>
-      <mc:AlternateContent xmlns:mc="http://schemas.openxmlformats.org/markup-compatibility/2006">
-        <mc:Choice xmlns:a14="http://schemas.microsoft.com/office/drawing/2010/main" Requires="a14">
+      <mc:AlternateContent xmlns:mc="http://schemas.openxmlformats.org/markup-compatibility/2006" xmlns:a14="http://schemas.microsoft.com/office/drawing/2010/main">
+        <mc:Choice Requires="a14">
           <p:sp>
             <p:nvSpPr>
               <p:cNvPr id="89" name="TextBox 88">
@@ -7050,6 +6874,7 @@
               </a:bodyPr>
               <a:lstStyle/>
               <a:p>
+                <a:pPr/>
                 <a14:m>
                   <m:oMathPara xmlns:m="http://schemas.openxmlformats.org/officeDocument/2006/math">
                     <m:oMathParaPr>
@@ -7082,7 +6907,7 @@
             </p:txBody>
           </p:sp>
         </mc:Choice>
-        <mc:Fallback>
+        <mc:Fallback xmlns="">
           <p:sp>
             <p:nvSpPr>
               <p:cNvPr id="89" name="TextBox 88">
@@ -7213,296 +7038,41 @@
           <a:lstStyle/>
           <a:p>
             <a:r>
-              <a:rPr lang="en-GB" dirty="0"/>
-              <a:t>Bruke </a:t>
+              <a:rPr lang="nb-NO" noProof="0" dirty="0"/>
+              <a:t>Bruke modell av kranen til å lage, og optimalisere, kontrollsystemet til den hydrauliske styringen</a:t>
             </a:r>
+          </a:p>
+          <a:p>
             <a:r>
-              <a:rPr lang="en-GB" dirty="0" err="1"/>
-              <a:t>modell</a:t>
-            </a:r>
-            <a:r>
-              <a:rPr lang="en-GB" dirty="0"/>
-              <a:t> </a:t>
-            </a:r>
-            <a:r>
-              <a:rPr lang="en-GB" dirty="0" err="1"/>
-              <a:t>av</a:t>
-            </a:r>
-            <a:r>
-              <a:rPr lang="en-GB" dirty="0"/>
-              <a:t> </a:t>
-            </a:r>
-            <a:r>
-              <a:rPr lang="en-GB" dirty="0" err="1"/>
-              <a:t>kranen</a:t>
-            </a:r>
-            <a:r>
-              <a:rPr lang="en-GB" dirty="0"/>
-              <a:t> </a:t>
-            </a:r>
-            <a:r>
-              <a:rPr lang="en-GB" dirty="0" err="1"/>
-              <a:t>til</a:t>
-            </a:r>
-            <a:r>
-              <a:rPr lang="en-GB" dirty="0"/>
-              <a:t> å </a:t>
-            </a:r>
-            <a:r>
-              <a:rPr lang="en-GB" dirty="0" err="1"/>
-              <a:t>lage</a:t>
-            </a:r>
-            <a:r>
-              <a:rPr lang="en-GB" dirty="0"/>
-              <a:t>, </a:t>
-            </a:r>
-            <a:r>
-              <a:rPr lang="en-GB" dirty="0" err="1"/>
-              <a:t>og</a:t>
-            </a:r>
-            <a:r>
-              <a:rPr lang="en-GB" dirty="0"/>
-              <a:t> </a:t>
-            </a:r>
-            <a:r>
-              <a:rPr lang="en-GB" dirty="0" err="1"/>
-              <a:t>optimalisere</a:t>
-            </a:r>
-            <a:r>
-              <a:rPr lang="en-GB" dirty="0"/>
-              <a:t>, </a:t>
-            </a:r>
-            <a:r>
-              <a:rPr lang="en-GB" dirty="0" err="1"/>
-              <a:t>kontrollsystemet</a:t>
-            </a:r>
-            <a:r>
-              <a:rPr lang="en-GB" dirty="0"/>
-              <a:t> </a:t>
-            </a:r>
-            <a:r>
-              <a:rPr lang="en-GB" dirty="0" err="1"/>
-              <a:t>til</a:t>
-            </a:r>
-            <a:r>
-              <a:rPr lang="en-GB" dirty="0"/>
-              <a:t> den </a:t>
-            </a:r>
-            <a:r>
-              <a:rPr lang="en-GB" dirty="0" err="1"/>
-              <a:t>hydrauliske</a:t>
-            </a:r>
-            <a:r>
-              <a:rPr lang="en-GB" dirty="0"/>
-              <a:t> </a:t>
-            </a:r>
-            <a:r>
-              <a:rPr lang="en-GB" dirty="0" err="1"/>
-              <a:t>styringen</a:t>
-            </a:r>
-            <a:endParaRPr lang="en-GB" dirty="0"/>
-          </a:p>
-          <a:p>
-            <a:r>
-              <a:rPr lang="en-GB" dirty="0" err="1"/>
-              <a:t>Justering</a:t>
-            </a:r>
-            <a:r>
-              <a:rPr lang="en-GB" dirty="0"/>
-              <a:t> </a:t>
-            </a:r>
-            <a:r>
-              <a:rPr lang="en-GB" dirty="0" err="1"/>
-              <a:t>av</a:t>
-            </a:r>
-            <a:r>
-              <a:rPr lang="en-GB" dirty="0"/>
-              <a:t> </a:t>
-            </a:r>
-            <a:r>
-              <a:rPr lang="en-GB" dirty="0" err="1"/>
-              <a:t>modellen</a:t>
-            </a:r>
-            <a:r>
-              <a:rPr lang="en-GB" dirty="0"/>
-              <a:t> </a:t>
-            </a:r>
-            <a:r>
-              <a:rPr lang="en-GB" dirty="0" err="1"/>
-              <a:t>ved</a:t>
-            </a:r>
-            <a:r>
-              <a:rPr lang="en-GB" dirty="0"/>
-              <a:t> å </a:t>
-            </a:r>
-            <a:r>
-              <a:rPr lang="en-GB" dirty="0" err="1"/>
-              <a:t>bruke</a:t>
-            </a:r>
-            <a:r>
-              <a:rPr lang="en-GB" dirty="0"/>
-              <a:t> </a:t>
-            </a:r>
-            <a:r>
-              <a:rPr lang="en-GB" dirty="0" err="1"/>
-              <a:t>måledata</a:t>
-            </a:r>
-            <a:r>
-              <a:rPr lang="en-GB" dirty="0"/>
-              <a:t>. </a:t>
+              <a:rPr lang="nb-NO" noProof="0" dirty="0"/>
+              <a:t>Justering av modellen ved å bruke måledata. </a:t>
             </a:r>
           </a:p>
           <a:p>
             <a:pPr lvl="1"/>
             <a:r>
-              <a:rPr lang="en-GB" dirty="0" err="1"/>
-              <a:t>Modelere</a:t>
+              <a:rPr lang="nb-NO" noProof="0" dirty="0"/>
+              <a:t>Modellere friksjonen i systemet</a:t>
             </a:r>
-            <a:r>
-              <a:rPr lang="en-GB" dirty="0"/>
-              <a:t> </a:t>
-            </a:r>
-            <a:r>
-              <a:rPr lang="en-GB" dirty="0" err="1"/>
-              <a:t>friksjonen</a:t>
-            </a:r>
-            <a:r>
-              <a:rPr lang="en-GB" dirty="0"/>
-              <a:t> </a:t>
-            </a:r>
-            <a:r>
-              <a:rPr lang="en-GB" dirty="0" err="1"/>
-              <a:t>i</a:t>
-            </a:r>
-            <a:r>
-              <a:rPr lang="en-GB" dirty="0"/>
-              <a:t> </a:t>
-            </a:r>
-            <a:r>
-              <a:rPr lang="en-GB" dirty="0" err="1"/>
-              <a:t>systemet</a:t>
-            </a:r>
-            <a:endParaRPr lang="en-GB" dirty="0"/>
           </a:p>
           <a:p>
             <a:pPr lvl="1"/>
             <a:r>
-              <a:rPr lang="en-GB" dirty="0" err="1"/>
-              <a:t>Modelere</a:t>
+              <a:rPr lang="nb-NO" noProof="0" dirty="0"/>
+              <a:t>Modellere hydrauliske ventiler</a:t>
             </a:r>
-            <a:r>
-              <a:rPr lang="en-GB" dirty="0"/>
-              <a:t> </a:t>
-            </a:r>
-            <a:r>
-              <a:rPr lang="en-GB" dirty="0" err="1"/>
-              <a:t>hydrauliske</a:t>
-            </a:r>
-            <a:r>
-              <a:rPr lang="en-GB" dirty="0"/>
-              <a:t> </a:t>
-            </a:r>
-            <a:r>
-              <a:rPr lang="en-GB" dirty="0" err="1"/>
-              <a:t>ventiler</a:t>
-            </a:r>
-            <a:endParaRPr lang="en-GB" dirty="0"/>
           </a:p>
           <a:p>
             <a:pPr lvl="1"/>
             <a:r>
-              <a:rPr lang="en-GB" dirty="0"/>
-              <a:t>Finne parameter </a:t>
+              <a:rPr lang="nb-NO" noProof="0" dirty="0"/>
+              <a:t>Finne parameter og justere på teoretiske parameter</a:t>
             </a:r>
+          </a:p>
+          <a:p>
             <a:r>
-              <a:rPr lang="en-GB" dirty="0" err="1"/>
-              <a:t>og</a:t>
-            </a:r>
-            <a:r>
-              <a:rPr lang="en-GB" dirty="0"/>
-              <a:t> </a:t>
-            </a:r>
-            <a:r>
-              <a:rPr lang="en-GB" dirty="0" err="1"/>
-              <a:t>justere</a:t>
-            </a:r>
-            <a:r>
-              <a:rPr lang="en-GB" dirty="0"/>
-              <a:t> </a:t>
-            </a:r>
-            <a:r>
-              <a:rPr lang="en-GB" dirty="0" err="1"/>
-              <a:t>på</a:t>
-            </a:r>
-            <a:r>
-              <a:rPr lang="en-GB" dirty="0"/>
-              <a:t> </a:t>
-            </a:r>
-            <a:r>
-              <a:rPr lang="en-GB" dirty="0" err="1"/>
-              <a:t>teoretiske</a:t>
-            </a:r>
-            <a:r>
-              <a:rPr lang="en-GB" dirty="0"/>
-              <a:t> parameter</a:t>
-            </a:r>
-          </a:p>
-          <a:p>
-            <a:r>
-              <a:rPr lang="en-GB" dirty="0" err="1"/>
-              <a:t>Potensiale</a:t>
-            </a:r>
-            <a:r>
-              <a:rPr lang="en-GB" dirty="0"/>
-              <a:t> for å teste </a:t>
-            </a:r>
-            <a:r>
-              <a:rPr lang="en-GB" dirty="0" err="1"/>
-              <a:t>andre</a:t>
-            </a:r>
-            <a:r>
-              <a:rPr lang="en-GB" dirty="0"/>
-              <a:t> </a:t>
-            </a:r>
-            <a:r>
-              <a:rPr lang="en-GB" dirty="0" err="1"/>
-              <a:t>konfigurasjoner</a:t>
-            </a:r>
-            <a:r>
-              <a:rPr lang="en-GB" dirty="0"/>
-              <a:t> </a:t>
-            </a:r>
-            <a:r>
-              <a:rPr lang="en-GB" dirty="0" err="1"/>
-              <a:t>som</a:t>
-            </a:r>
-            <a:r>
-              <a:rPr lang="en-GB" dirty="0"/>
-              <a:t> </a:t>
-            </a:r>
-            <a:r>
-              <a:rPr lang="en-GB" dirty="0" err="1"/>
-              <a:t>ikke</a:t>
-            </a:r>
-            <a:r>
-              <a:rPr lang="en-GB" dirty="0"/>
-              <a:t> er </a:t>
-            </a:r>
-            <a:r>
-              <a:rPr lang="en-GB" dirty="0" err="1"/>
-              <a:t>mulig</a:t>
-            </a:r>
-            <a:r>
-              <a:rPr lang="en-GB" dirty="0"/>
-              <a:t> å teste i </a:t>
-            </a:r>
-            <a:r>
-              <a:rPr lang="en-GB" dirty="0" err="1"/>
-              <a:t>labben</a:t>
-            </a:r>
-            <a:r>
-              <a:rPr lang="en-GB" dirty="0"/>
-              <a:t>.</a:t>
+              <a:rPr lang="nb-NO" noProof="0" dirty="0"/>
+              <a:t>Potensiale for å teste andre konfigurasjoner som ikke er mulig å teste i labben.</a:t>
             </a:r>
           </a:p>
         </p:txBody>
@@ -9439,7 +9009,7 @@
 </file>
 
 <file path=ppt/slides/slide7.xml><?xml version="1.0" encoding="utf-8"?>
-<p:sld xmlns:a="http://schemas.openxmlformats.org/drawingml/2006/main" xmlns:r="http://schemas.openxmlformats.org/officeDocument/2006/relationships" xmlns:p="http://schemas.openxmlformats.org/presentationml/2006/main">
+<p:sld xmlns:a="http://schemas.openxmlformats.org/drawingml/2006/main" xmlns:r="http://schemas.openxmlformats.org/officeDocument/2006/relationships" xmlns:p="http://schemas.openxmlformats.org/presentationml/2006/main" show="0">
   <p:cSld>
     <p:spTree>
       <p:nvGrpSpPr>

</xml_diff>

<commit_message>
laget ny display model og laget video oav kjøring i model
</commit_message>
<xml_diff>
--- a/Presentasjon/presentasjon for servi 18.03.25.pptx
+++ b/Presentasjon/presentasjon for servi 18.03.25.pptx
@@ -11,7 +11,6 @@
     <p:sldId id="259" r:id="rId5"/>
     <p:sldId id="260" r:id="rId6"/>
     <p:sldId id="262" r:id="rId7"/>
-    <p:sldId id="261" r:id="rId8"/>
   </p:sldIdLst>
   <p:sldSz cx="12192000" cy="6858000"/>
   <p:notesSz cx="6858000" cy="9144000"/>
@@ -267,7 +266,7 @@
           <a:p>
             <a:fld id="{30C91E78-4D18-4D45-B649-677413846CF6}" type="datetimeFigureOut">
               <a:rPr lang="en-GB" smtClean="0"/>
-              <a:t>17/03/2025</a:t>
+              <a:t>18/03/2025</a:t>
             </a:fld>
             <a:endParaRPr lang="en-GB"/>
           </a:p>
@@ -467,7 +466,7 @@
           <a:p>
             <a:fld id="{30C91E78-4D18-4D45-B649-677413846CF6}" type="datetimeFigureOut">
               <a:rPr lang="en-GB" smtClean="0"/>
-              <a:t>17/03/2025</a:t>
+              <a:t>18/03/2025</a:t>
             </a:fld>
             <a:endParaRPr lang="en-GB"/>
           </a:p>
@@ -677,7 +676,7 @@
           <a:p>
             <a:fld id="{30C91E78-4D18-4D45-B649-677413846CF6}" type="datetimeFigureOut">
               <a:rPr lang="en-GB" smtClean="0"/>
-              <a:t>17/03/2025</a:t>
+              <a:t>18/03/2025</a:t>
             </a:fld>
             <a:endParaRPr lang="en-GB"/>
           </a:p>
@@ -877,7 +876,7 @@
           <a:p>
             <a:fld id="{30C91E78-4D18-4D45-B649-677413846CF6}" type="datetimeFigureOut">
               <a:rPr lang="en-GB" smtClean="0"/>
-              <a:t>17/03/2025</a:t>
+              <a:t>18/03/2025</a:t>
             </a:fld>
             <a:endParaRPr lang="en-GB"/>
           </a:p>
@@ -1153,7 +1152,7 @@
           <a:p>
             <a:fld id="{30C91E78-4D18-4D45-B649-677413846CF6}" type="datetimeFigureOut">
               <a:rPr lang="en-GB" smtClean="0"/>
-              <a:t>17/03/2025</a:t>
+              <a:t>18/03/2025</a:t>
             </a:fld>
             <a:endParaRPr lang="en-GB"/>
           </a:p>
@@ -1421,7 +1420,7 @@
           <a:p>
             <a:fld id="{30C91E78-4D18-4D45-B649-677413846CF6}" type="datetimeFigureOut">
               <a:rPr lang="en-GB" smtClean="0"/>
-              <a:t>17/03/2025</a:t>
+              <a:t>18/03/2025</a:t>
             </a:fld>
             <a:endParaRPr lang="en-GB"/>
           </a:p>
@@ -1836,7 +1835,7 @@
           <a:p>
             <a:fld id="{30C91E78-4D18-4D45-B649-677413846CF6}" type="datetimeFigureOut">
               <a:rPr lang="en-GB" smtClean="0"/>
-              <a:t>17/03/2025</a:t>
+              <a:t>18/03/2025</a:t>
             </a:fld>
             <a:endParaRPr lang="en-GB"/>
           </a:p>
@@ -1978,7 +1977,7 @@
           <a:p>
             <a:fld id="{30C91E78-4D18-4D45-B649-677413846CF6}" type="datetimeFigureOut">
               <a:rPr lang="en-GB" smtClean="0"/>
-              <a:t>17/03/2025</a:t>
+              <a:t>18/03/2025</a:t>
             </a:fld>
             <a:endParaRPr lang="en-GB"/>
           </a:p>
@@ -2091,7 +2090,7 @@
           <a:p>
             <a:fld id="{30C91E78-4D18-4D45-B649-677413846CF6}" type="datetimeFigureOut">
               <a:rPr lang="en-GB" smtClean="0"/>
-              <a:t>17/03/2025</a:t>
+              <a:t>18/03/2025</a:t>
             </a:fld>
             <a:endParaRPr lang="en-GB"/>
           </a:p>
@@ -2404,7 +2403,7 @@
           <a:p>
             <a:fld id="{30C91E78-4D18-4D45-B649-677413846CF6}" type="datetimeFigureOut">
               <a:rPr lang="en-GB" smtClean="0"/>
-              <a:t>17/03/2025</a:t>
+              <a:t>18/03/2025</a:t>
             </a:fld>
             <a:endParaRPr lang="en-GB"/>
           </a:p>
@@ -2693,7 +2692,7 @@
           <a:p>
             <a:fld id="{30C91E78-4D18-4D45-B649-677413846CF6}" type="datetimeFigureOut">
               <a:rPr lang="en-GB" smtClean="0"/>
-              <a:t>17/03/2025</a:t>
+              <a:t>18/03/2025</a:t>
             </a:fld>
             <a:endParaRPr lang="en-GB"/>
           </a:p>
@@ -2936,7 +2935,7 @@
           <a:p>
             <a:fld id="{30C91E78-4D18-4D45-B649-677413846CF6}" type="datetimeFigureOut">
               <a:rPr lang="en-GB" smtClean="0"/>
-              <a:t>17/03/2025</a:t>
+              <a:t>18/03/2025</a:t>
             </a:fld>
             <a:endParaRPr lang="en-GB"/>
           </a:p>
@@ -3353,6 +3352,42 @@
           <a:chExt cx="0" cy="0"/>
         </a:xfrm>
       </p:grpSpPr>
+      <p:pic>
+        <p:nvPicPr>
+          <p:cNvPr id="5" name="Picture 4" descr="A large machine in a room&#10;&#10;AI-generated content may be incorrect.">
+            <a:extLst>
+              <a:ext uri="{FF2B5EF4-FFF2-40B4-BE49-F238E27FC236}">
+                <a16:creationId xmlns:a16="http://schemas.microsoft.com/office/drawing/2014/main" id="{F0669E39-936E-4209-D640-1737DB2A9F97}"/>
+              </a:ext>
+            </a:extLst>
+          </p:cNvPr>
+          <p:cNvPicPr>
+            <a:picLocks noChangeAspect="1"/>
+          </p:cNvPicPr>
+          <p:nvPr/>
+        </p:nvPicPr>
+        <p:blipFill>
+          <a:blip r:embed="rId2">
+            <a:extLst>
+              <a:ext uri="{28A0092B-C50C-407E-A947-70E740481C1C}">
+                <a14:useLocalDpi xmlns:a14="http://schemas.microsoft.com/office/drawing/2010/main" val="0"/>
+              </a:ext>
+            </a:extLst>
+          </a:blip>
+          <a:stretch>
+            <a:fillRect/>
+          </a:stretch>
+        </p:blipFill>
+        <p:spPr>
+          <a:xfrm>
+            <a:off x="0" y="0"/>
+            <a:ext cx="12192000" cy="6858000"/>
+          </a:xfrm>
+          <a:prstGeom prst="rect">
+            <a:avLst/>
+          </a:prstGeom>
+        </p:spPr>
+      </p:pic>
       <p:sp>
         <p:nvSpPr>
           <p:cNvPr id="2" name="Title 1">
@@ -3369,37 +3404,50 @@
             <p:ph type="ctrTitle"/>
           </p:nvPr>
         </p:nvSpPr>
-        <p:spPr/>
+        <p:spPr>
+          <a:xfrm>
+            <a:off x="2330245" y="4463844"/>
+            <a:ext cx="8858865" cy="2261267"/>
+          </a:xfrm>
+          <a:solidFill>
+            <a:schemeClr val="dk1">
+              <a:alpha val="50000"/>
+            </a:schemeClr>
+          </a:solidFill>
+          <a:ln>
+            <a:solidFill>
+              <a:schemeClr val="tx1"/>
+            </a:solidFill>
+          </a:ln>
+        </p:spPr>
+        <p:style>
+          <a:lnRef idx="0">
+            <a:scrgbClr r="0" g="0" b="0"/>
+          </a:lnRef>
+          <a:fillRef idx="0">
+            <a:scrgbClr r="0" g="0" b="0"/>
+          </a:fillRef>
+          <a:effectRef idx="0">
+            <a:scrgbClr r="0" g="0" b="0"/>
+          </a:effectRef>
+          <a:fontRef idx="minor">
+            <a:schemeClr val="lt1"/>
+          </a:fontRef>
+        </p:style>
         <p:txBody>
-          <a:bodyPr/>
+          <a:bodyPr>
+            <a:normAutofit fontScale="90000"/>
+          </a:bodyPr>
           <a:lstStyle/>
           <a:p>
-            <a:endParaRPr lang="en-GB"/>
-          </a:p>
-        </p:txBody>
-      </p:sp>
-      <p:sp>
-        <p:nvSpPr>
-          <p:cNvPr id="3" name="Subtitle 2">
-            <a:extLst>
-              <a:ext uri="{FF2B5EF4-FFF2-40B4-BE49-F238E27FC236}">
-                <a16:creationId xmlns:a16="http://schemas.microsoft.com/office/drawing/2014/main" id="{C69D5C36-67DB-E6CD-52C5-E57A97A7CFBC}"/>
-              </a:ext>
-            </a:extLst>
-          </p:cNvPr>
-          <p:cNvSpPr>
-            <a:spLocks noGrp="1"/>
-          </p:cNvSpPr>
-          <p:nvPr>
-            <p:ph type="subTitle" idx="1"/>
-          </p:nvPr>
-        </p:nvSpPr>
-        <p:spPr/>
-        <p:txBody>
-          <a:bodyPr/>
-          <a:lstStyle/>
-          <a:p>
-            <a:endParaRPr lang="en-GB"/>
+            <a:r>
+              <a:rPr lang="en-GB" dirty="0">
+                <a:solidFill>
+                  <a:schemeClr val="bg1"/>
+                </a:solidFill>
+              </a:rPr>
+              <a:t>Model-Based Design for Load-Independent Motion Control in Hydraulic Systems</a:t>
+            </a:r>
           </a:p>
         </p:txBody>
       </p:sp>
@@ -3621,23 +3669,7 @@
               <a:p>
                 <a:r>
                   <a:rPr lang="nb-NO" noProof="0" dirty="0"/>
-                  <a:t>Siden trykkompensatoren fjernes trenger man å måle trykkene på hver side av ventilen, og bruke </a:t>
-                </a:r>
-                <a:r>
-                  <a:rPr lang="nb-NO" noProof="0" dirty="0" err="1"/>
-                  <a:t>strupningsformelen</a:t>
-                </a:r>
-                <a:r>
-                  <a:rPr lang="nb-NO" noProof="0" dirty="0"/>
-                  <a:t> til å regne ut </a:t>
-                </a:r>
-                <a:r>
-                  <a:rPr lang="nb-NO" noProof="0" dirty="0" err="1"/>
-                  <a:t>flow</a:t>
-                </a:r>
-                <a:r>
-                  <a:rPr lang="nb-NO" noProof="0" dirty="0"/>
-                  <a:t> gjennom ventilen.</a:t>
+                  <a:t>Siden trykkompensatoren fjernes trenger man å måle trykkene på hver side av ventilen, og bruke strupningsformelen til å regne ut flow gjennom ventilen.</a:t>
                 </a:r>
               </a:p>
             </p:txBody>
@@ -3673,7 +3705,7 @@
               <a:lstStyle/>
               <a:p>
                 <a:r>
-                  <a:rPr lang="nb-NO">
+                  <a:rPr lang="en-GB">
                     <a:noFill/>
                   </a:rPr>
                   <a:t> </a:t>
@@ -7005,7 +7037,7 @@
           <a:p>
             <a:r>
               <a:rPr lang="nb-NO" dirty="0"/>
-              <a:t>Simulerings model</a:t>
+              <a:t>Simuleringsmodell</a:t>
             </a:r>
             <a:endParaRPr lang="en-GB" dirty="0"/>
           </a:p>
@@ -7902,7 +7934,7 @@
           <a:p>
             <a:r>
               <a:rPr lang="nb-NO" dirty="0"/>
-              <a:t>Hver enkelt akutuator</a:t>
+              <a:t>Hver enkelt aktuator</a:t>
             </a:r>
           </a:p>
           <a:p>
@@ -9008,90 +9040,6 @@
 </p:sld>
 </file>
 
-<file path=ppt/slides/slide7.xml><?xml version="1.0" encoding="utf-8"?>
-<p:sld xmlns:a="http://schemas.openxmlformats.org/drawingml/2006/main" xmlns:r="http://schemas.openxmlformats.org/officeDocument/2006/relationships" xmlns:p="http://schemas.openxmlformats.org/presentationml/2006/main" show="0">
-  <p:cSld>
-    <p:spTree>
-      <p:nvGrpSpPr>
-        <p:cNvPr id="1" name=""/>
-        <p:cNvGrpSpPr/>
-        <p:nvPr/>
-      </p:nvGrpSpPr>
-      <p:grpSpPr>
-        <a:xfrm>
-          <a:off x="0" y="0"/>
-          <a:ext cx="0" cy="0"/>
-          <a:chOff x="0" y="0"/>
-          <a:chExt cx="0" cy="0"/>
-        </a:xfrm>
-      </p:grpSpPr>
-      <p:sp>
-        <p:nvSpPr>
-          <p:cNvPr id="2" name="Title 1">
-            <a:extLst>
-              <a:ext uri="{FF2B5EF4-FFF2-40B4-BE49-F238E27FC236}">
-                <a16:creationId xmlns:a16="http://schemas.microsoft.com/office/drawing/2014/main" id="{116197E0-327F-E170-7961-5CF76FCBE177}"/>
-              </a:ext>
-            </a:extLst>
-          </p:cNvPr>
-          <p:cNvSpPr>
-            <a:spLocks noGrp="1"/>
-          </p:cNvSpPr>
-          <p:nvPr>
-            <p:ph type="title"/>
-          </p:nvPr>
-        </p:nvSpPr>
-        <p:spPr/>
-        <p:txBody>
-          <a:bodyPr/>
-          <a:lstStyle/>
-          <a:p>
-            <a:r>
-              <a:rPr lang="nb-NO" dirty="0"/>
-              <a:t>Sammenligning av modell og virkelighet </a:t>
-            </a:r>
-            <a:endParaRPr lang="en-GB" dirty="0"/>
-          </a:p>
-        </p:txBody>
-      </p:sp>
-      <p:sp>
-        <p:nvSpPr>
-          <p:cNvPr id="3" name="Content Placeholder 2">
-            <a:extLst>
-              <a:ext uri="{FF2B5EF4-FFF2-40B4-BE49-F238E27FC236}">
-                <a16:creationId xmlns:a16="http://schemas.microsoft.com/office/drawing/2014/main" id="{E658B4F3-7535-02BA-BFF4-83C9F6C4D8B2}"/>
-              </a:ext>
-            </a:extLst>
-          </p:cNvPr>
-          <p:cNvSpPr>
-            <a:spLocks noGrp="1"/>
-          </p:cNvSpPr>
-          <p:nvPr>
-            <p:ph idx="1"/>
-          </p:nvPr>
-        </p:nvSpPr>
-        <p:spPr/>
-        <p:txBody>
-          <a:bodyPr/>
-          <a:lstStyle/>
-          <a:p>
-            <a:endParaRPr lang="en-GB" dirty="0"/>
-          </a:p>
-        </p:txBody>
-      </p:sp>
-    </p:spTree>
-    <p:extLst>
-      <p:ext uri="{BB962C8B-B14F-4D97-AF65-F5344CB8AC3E}">
-        <p14:creationId xmlns:p14="http://schemas.microsoft.com/office/powerpoint/2010/main" val="4199992096"/>
-      </p:ext>
-    </p:extLst>
-  </p:cSld>
-  <p:clrMapOvr>
-    <a:masterClrMapping/>
-  </p:clrMapOvr>
-</p:sld>
-</file>
-
 <file path=ppt/theme/theme1.xml><?xml version="1.0" encoding="utf-8"?>
 <a:theme xmlns:a="http://schemas.openxmlformats.org/drawingml/2006/main" name="Office Theme">
   <a:themeElements>

</xml_diff>

<commit_message>
lagt til CBV jib calculations og modell med friction
</commit_message>
<xml_diff>
--- a/Presentasjon/presentasjon for servi 18.03.25.pptx
+++ b/Presentasjon/presentasjon for servi 18.03.25.pptx
@@ -266,7 +266,7 @@
           <a:p>
             <a:fld id="{30C91E78-4D18-4D45-B649-677413846CF6}" type="datetimeFigureOut">
               <a:rPr lang="en-GB" smtClean="0"/>
-              <a:t>18/03/2025</a:t>
+              <a:t>24/03/2025</a:t>
             </a:fld>
             <a:endParaRPr lang="en-GB"/>
           </a:p>
@@ -466,7 +466,7 @@
           <a:p>
             <a:fld id="{30C91E78-4D18-4D45-B649-677413846CF6}" type="datetimeFigureOut">
               <a:rPr lang="en-GB" smtClean="0"/>
-              <a:t>18/03/2025</a:t>
+              <a:t>24/03/2025</a:t>
             </a:fld>
             <a:endParaRPr lang="en-GB"/>
           </a:p>
@@ -676,7 +676,7 @@
           <a:p>
             <a:fld id="{30C91E78-4D18-4D45-B649-677413846CF6}" type="datetimeFigureOut">
               <a:rPr lang="en-GB" smtClean="0"/>
-              <a:t>18/03/2025</a:t>
+              <a:t>24/03/2025</a:t>
             </a:fld>
             <a:endParaRPr lang="en-GB"/>
           </a:p>
@@ -876,7 +876,7 @@
           <a:p>
             <a:fld id="{30C91E78-4D18-4D45-B649-677413846CF6}" type="datetimeFigureOut">
               <a:rPr lang="en-GB" smtClean="0"/>
-              <a:t>18/03/2025</a:t>
+              <a:t>24/03/2025</a:t>
             </a:fld>
             <a:endParaRPr lang="en-GB"/>
           </a:p>
@@ -1152,7 +1152,7 @@
           <a:p>
             <a:fld id="{30C91E78-4D18-4D45-B649-677413846CF6}" type="datetimeFigureOut">
               <a:rPr lang="en-GB" smtClean="0"/>
-              <a:t>18/03/2025</a:t>
+              <a:t>24/03/2025</a:t>
             </a:fld>
             <a:endParaRPr lang="en-GB"/>
           </a:p>
@@ -1420,7 +1420,7 @@
           <a:p>
             <a:fld id="{30C91E78-4D18-4D45-B649-677413846CF6}" type="datetimeFigureOut">
               <a:rPr lang="en-GB" smtClean="0"/>
-              <a:t>18/03/2025</a:t>
+              <a:t>24/03/2025</a:t>
             </a:fld>
             <a:endParaRPr lang="en-GB"/>
           </a:p>
@@ -1835,7 +1835,7 @@
           <a:p>
             <a:fld id="{30C91E78-4D18-4D45-B649-677413846CF6}" type="datetimeFigureOut">
               <a:rPr lang="en-GB" smtClean="0"/>
-              <a:t>18/03/2025</a:t>
+              <a:t>24/03/2025</a:t>
             </a:fld>
             <a:endParaRPr lang="en-GB"/>
           </a:p>
@@ -1977,7 +1977,7 @@
           <a:p>
             <a:fld id="{30C91E78-4D18-4D45-B649-677413846CF6}" type="datetimeFigureOut">
               <a:rPr lang="en-GB" smtClean="0"/>
-              <a:t>18/03/2025</a:t>
+              <a:t>24/03/2025</a:t>
             </a:fld>
             <a:endParaRPr lang="en-GB"/>
           </a:p>
@@ -2090,7 +2090,7 @@
           <a:p>
             <a:fld id="{30C91E78-4D18-4D45-B649-677413846CF6}" type="datetimeFigureOut">
               <a:rPr lang="en-GB" smtClean="0"/>
-              <a:t>18/03/2025</a:t>
+              <a:t>24/03/2025</a:t>
             </a:fld>
             <a:endParaRPr lang="en-GB"/>
           </a:p>
@@ -2403,7 +2403,7 @@
           <a:p>
             <a:fld id="{30C91E78-4D18-4D45-B649-677413846CF6}" type="datetimeFigureOut">
               <a:rPr lang="en-GB" smtClean="0"/>
-              <a:t>18/03/2025</a:t>
+              <a:t>24/03/2025</a:t>
             </a:fld>
             <a:endParaRPr lang="en-GB"/>
           </a:p>
@@ -2692,7 +2692,7 @@
           <a:p>
             <a:fld id="{30C91E78-4D18-4D45-B649-677413846CF6}" type="datetimeFigureOut">
               <a:rPr lang="en-GB" smtClean="0"/>
-              <a:t>18/03/2025</a:t>
+              <a:t>24/03/2025</a:t>
             </a:fld>
             <a:endParaRPr lang="en-GB"/>
           </a:p>
@@ -2935,7 +2935,7 @@
           <a:p>
             <a:fld id="{30C91E78-4D18-4D45-B649-677413846CF6}" type="datetimeFigureOut">
               <a:rPr lang="en-GB" smtClean="0"/>
-              <a:t>18/03/2025</a:t>
+              <a:t>24/03/2025</a:t>
             </a:fld>
             <a:endParaRPr lang="en-GB"/>
           </a:p>
@@ -3510,8 +3510,8 @@
           </a:p>
         </p:txBody>
       </p:sp>
-      <mc:AlternateContent xmlns:mc="http://schemas.openxmlformats.org/markup-compatibility/2006">
-        <mc:Choice xmlns:a14="http://schemas.microsoft.com/office/drawing/2010/main" Requires="a14">
+      <mc:AlternateContent xmlns:mc="http://schemas.openxmlformats.org/markup-compatibility/2006" xmlns:a14="http://schemas.microsoft.com/office/drawing/2010/main">
+        <mc:Choice Requires="a14">
           <p:sp>
             <p:nvSpPr>
               <p:cNvPr id="3" name="Content Placeholder 2">
@@ -3675,7 +3675,7 @@
             </p:txBody>
           </p:sp>
         </mc:Choice>
-        <mc:Fallback>
+        <mc:Fallback xmlns="">
           <p:sp>
             <p:nvSpPr>
               <p:cNvPr id="3" name="Content Placeholder 2">
@@ -3774,1560 +3774,6 @@
           </a:p>
         </p:txBody>
       </p:sp>
-      <p:grpSp>
-        <p:nvGrpSpPr>
-          <p:cNvPr id="81" name="Group 80">
-            <a:extLst>
-              <a:ext uri="{FF2B5EF4-FFF2-40B4-BE49-F238E27FC236}">
-                <a16:creationId xmlns:a16="http://schemas.microsoft.com/office/drawing/2014/main" id="{5B404942-9BCD-EF90-C83B-B477BFB9B32E}"/>
-              </a:ext>
-            </a:extLst>
-          </p:cNvPr>
-          <p:cNvGrpSpPr/>
-          <p:nvPr/>
-        </p:nvGrpSpPr>
-        <p:grpSpPr>
-          <a:xfrm>
-            <a:off x="162615" y="2252753"/>
-            <a:ext cx="5291404" cy="3818482"/>
-            <a:chOff x="162615" y="2003833"/>
-            <a:chExt cx="5291404" cy="3818482"/>
-          </a:xfrm>
-        </p:grpSpPr>
-        <p:sp>
-          <p:nvSpPr>
-            <p:cNvPr id="4" name="Rectangle 3">
-              <a:extLst>
-                <a:ext uri="{FF2B5EF4-FFF2-40B4-BE49-F238E27FC236}">
-                  <a16:creationId xmlns:a16="http://schemas.microsoft.com/office/drawing/2014/main" id="{FB01CB67-F019-D97C-59C9-B0A035DA3FD5}"/>
-                </a:ext>
-              </a:extLst>
-            </p:cNvPr>
-            <p:cNvSpPr/>
-            <p:nvPr/>
-          </p:nvSpPr>
-          <p:spPr>
-            <a:xfrm>
-              <a:off x="3227240" y="2003833"/>
-              <a:ext cx="1232213" cy="902191"/>
-            </a:xfrm>
-            <a:prstGeom prst="rect">
-              <a:avLst/>
-            </a:prstGeom>
-          </p:spPr>
-          <p:style>
-            <a:lnRef idx="2">
-              <a:schemeClr val="accent1">
-                <a:shade val="15000"/>
-              </a:schemeClr>
-            </a:lnRef>
-            <a:fillRef idx="1">
-              <a:schemeClr val="accent1"/>
-            </a:fillRef>
-            <a:effectRef idx="0">
-              <a:schemeClr val="accent1"/>
-            </a:effectRef>
-            <a:fontRef idx="minor">
-              <a:schemeClr val="lt1"/>
-            </a:fontRef>
-          </p:style>
-          <p:txBody>
-            <a:bodyPr rtlCol="0" anchor="ctr"/>
-            <a:lstStyle/>
-            <a:p>
-              <a:pPr algn="ctr"/>
-              <a:r>
-                <a:rPr lang="nb-NO" dirty="0"/>
-                <a:t>Feed Forward</a:t>
-              </a:r>
-              <a:endParaRPr lang="en-GB" dirty="0"/>
-            </a:p>
-          </p:txBody>
-        </p:sp>
-        <p:sp>
-          <p:nvSpPr>
-            <p:cNvPr id="5" name="Rectangle 4">
-              <a:extLst>
-                <a:ext uri="{FF2B5EF4-FFF2-40B4-BE49-F238E27FC236}">
-                  <a16:creationId xmlns:a16="http://schemas.microsoft.com/office/drawing/2014/main" id="{CD071B50-F41A-EE9D-CDEC-C1EC8ABA3403}"/>
-                </a:ext>
-              </a:extLst>
-            </p:cNvPr>
-            <p:cNvSpPr/>
-            <p:nvPr/>
-          </p:nvSpPr>
-          <p:spPr>
-            <a:xfrm>
-              <a:off x="2960541" y="4920124"/>
-              <a:ext cx="950210" cy="902191"/>
-            </a:xfrm>
-            <a:prstGeom prst="rect">
-              <a:avLst/>
-            </a:prstGeom>
-          </p:spPr>
-          <p:style>
-            <a:lnRef idx="2">
-              <a:schemeClr val="accent1">
-                <a:shade val="15000"/>
-              </a:schemeClr>
-            </a:lnRef>
-            <a:fillRef idx="1">
-              <a:schemeClr val="accent1"/>
-            </a:fillRef>
-            <a:effectRef idx="0">
-              <a:schemeClr val="accent1"/>
-            </a:effectRef>
-            <a:fontRef idx="minor">
-              <a:schemeClr val="lt1"/>
-            </a:fontRef>
-          </p:style>
-          <p:txBody>
-            <a:bodyPr rtlCol="0" anchor="ctr"/>
-            <a:lstStyle/>
-            <a:p>
-              <a:pPr algn="ctr"/>
-              <a:r>
-                <a:rPr lang="nb-NO" dirty="0"/>
-                <a:t>System</a:t>
-              </a:r>
-              <a:endParaRPr lang="en-GB" dirty="0"/>
-            </a:p>
-          </p:txBody>
-        </p:sp>
-        <p:sp>
-          <p:nvSpPr>
-            <p:cNvPr id="6" name="Rectangle 5">
-              <a:extLst>
-                <a:ext uri="{FF2B5EF4-FFF2-40B4-BE49-F238E27FC236}">
-                  <a16:creationId xmlns:a16="http://schemas.microsoft.com/office/drawing/2014/main" id="{16C6BF87-5F9E-6A7F-A24D-7A22FC051C85}"/>
-                </a:ext>
-              </a:extLst>
-            </p:cNvPr>
-            <p:cNvSpPr/>
-            <p:nvPr/>
-          </p:nvSpPr>
-          <p:spPr>
-            <a:xfrm>
-              <a:off x="4547671" y="4920124"/>
-              <a:ext cx="893478" cy="902191"/>
-            </a:xfrm>
-            <a:prstGeom prst="rect">
-              <a:avLst/>
-            </a:prstGeom>
-          </p:spPr>
-          <p:style>
-            <a:lnRef idx="2">
-              <a:schemeClr val="accent1">
-                <a:shade val="15000"/>
-              </a:schemeClr>
-            </a:lnRef>
-            <a:fillRef idx="1">
-              <a:schemeClr val="accent1"/>
-            </a:fillRef>
-            <a:effectRef idx="0">
-              <a:schemeClr val="accent1"/>
-            </a:effectRef>
-            <a:fontRef idx="minor">
-              <a:schemeClr val="lt1"/>
-            </a:fontRef>
-          </p:style>
-          <p:txBody>
-            <a:bodyPr rtlCol="0" anchor="ctr"/>
-            <a:lstStyle/>
-            <a:p>
-              <a:pPr algn="ctr"/>
-              <a:r>
-                <a:rPr lang="nb-NO" dirty="0"/>
-                <a:t>DCV</a:t>
-              </a:r>
-              <a:endParaRPr lang="en-GB" dirty="0"/>
-            </a:p>
-          </p:txBody>
-        </p:sp>
-        <p:sp>
-          <p:nvSpPr>
-            <p:cNvPr id="7" name="Rectangle 6">
-              <a:extLst>
-                <a:ext uri="{FF2B5EF4-FFF2-40B4-BE49-F238E27FC236}">
-                  <a16:creationId xmlns:a16="http://schemas.microsoft.com/office/drawing/2014/main" id="{DBB1C8AA-AFAC-9D4B-7E36-CC83AE7B5360}"/>
-                </a:ext>
-              </a:extLst>
-            </p:cNvPr>
-            <p:cNvSpPr/>
-            <p:nvPr/>
-          </p:nvSpPr>
-          <p:spPr>
-            <a:xfrm>
-              <a:off x="3604090" y="3386535"/>
-              <a:ext cx="849992" cy="902191"/>
-            </a:xfrm>
-            <a:prstGeom prst="rect">
-              <a:avLst/>
-            </a:prstGeom>
-          </p:spPr>
-          <p:style>
-            <a:lnRef idx="2">
-              <a:schemeClr val="accent1">
-                <a:shade val="15000"/>
-              </a:schemeClr>
-            </a:lnRef>
-            <a:fillRef idx="1">
-              <a:schemeClr val="accent1"/>
-            </a:fillRef>
-            <a:effectRef idx="0">
-              <a:schemeClr val="accent1"/>
-            </a:effectRef>
-            <a:fontRef idx="minor">
-              <a:schemeClr val="lt1"/>
-            </a:fontRef>
-          </p:style>
-          <p:txBody>
-            <a:bodyPr rtlCol="0" anchor="ctr"/>
-            <a:lstStyle/>
-            <a:p>
-              <a:pPr algn="ctr"/>
-              <a:r>
-                <a:rPr lang="nb-NO" dirty="0"/>
-                <a:t>PID</a:t>
-              </a:r>
-              <a:endParaRPr lang="en-GB" dirty="0"/>
-            </a:p>
-          </p:txBody>
-        </p:sp>
-        <p:sp>
-          <p:nvSpPr>
-            <p:cNvPr id="8" name="Oval 7">
-              <a:extLst>
-                <a:ext uri="{FF2B5EF4-FFF2-40B4-BE49-F238E27FC236}">
-                  <a16:creationId xmlns:a16="http://schemas.microsoft.com/office/drawing/2014/main" id="{AB9C7E47-CAC0-4AC5-34CE-C32825CAB0C2}"/>
-                </a:ext>
-              </a:extLst>
-            </p:cNvPr>
-            <p:cNvSpPr/>
-            <p:nvPr/>
-          </p:nvSpPr>
-          <p:spPr>
-            <a:xfrm>
-              <a:off x="4814410" y="3657630"/>
-              <a:ext cx="360000" cy="360000"/>
-            </a:xfrm>
-            <a:prstGeom prst="ellipse">
-              <a:avLst/>
-            </a:prstGeom>
-          </p:spPr>
-          <p:style>
-            <a:lnRef idx="2">
-              <a:schemeClr val="accent1">
-                <a:shade val="15000"/>
-              </a:schemeClr>
-            </a:lnRef>
-            <a:fillRef idx="1">
-              <a:schemeClr val="accent1"/>
-            </a:fillRef>
-            <a:effectRef idx="0">
-              <a:schemeClr val="accent1"/>
-            </a:effectRef>
-            <a:fontRef idx="minor">
-              <a:schemeClr val="lt1"/>
-            </a:fontRef>
-          </p:style>
-          <p:txBody>
-            <a:bodyPr rtlCol="0" anchor="ctr"/>
-            <a:lstStyle/>
-            <a:p>
-              <a:pPr algn="ctr"/>
-              <a:endParaRPr lang="en-GB"/>
-            </a:p>
-          </p:txBody>
-        </p:sp>
-        <p:sp>
-          <p:nvSpPr>
-            <p:cNvPr id="9" name="Oval 8">
-              <a:extLst>
-                <a:ext uri="{FF2B5EF4-FFF2-40B4-BE49-F238E27FC236}">
-                  <a16:creationId xmlns:a16="http://schemas.microsoft.com/office/drawing/2014/main" id="{D735C08D-3E8D-089F-543E-07D99E6E21DC}"/>
-                </a:ext>
-              </a:extLst>
-            </p:cNvPr>
-            <p:cNvSpPr/>
-            <p:nvPr/>
-          </p:nvSpPr>
-          <p:spPr>
-            <a:xfrm>
-              <a:off x="2342803" y="3657630"/>
-              <a:ext cx="360000" cy="360000"/>
-            </a:xfrm>
-            <a:prstGeom prst="ellipse">
-              <a:avLst/>
-            </a:prstGeom>
-          </p:spPr>
-          <p:style>
-            <a:lnRef idx="2">
-              <a:schemeClr val="accent1">
-                <a:shade val="15000"/>
-              </a:schemeClr>
-            </a:lnRef>
-            <a:fillRef idx="1">
-              <a:schemeClr val="accent1"/>
-            </a:fillRef>
-            <a:effectRef idx="0">
-              <a:schemeClr val="accent1"/>
-            </a:effectRef>
-            <a:fontRef idx="minor">
-              <a:schemeClr val="lt1"/>
-            </a:fontRef>
-          </p:style>
-          <p:txBody>
-            <a:bodyPr rtlCol="0" anchor="ctr"/>
-            <a:lstStyle/>
-            <a:p>
-              <a:pPr algn="ctr"/>
-              <a:endParaRPr lang="en-GB"/>
-            </a:p>
-          </p:txBody>
-        </p:sp>
-        <p:cxnSp>
-          <p:nvCxnSpPr>
-            <p:cNvPr id="10" name="Straight Connector 9">
-              <a:extLst>
-                <a:ext uri="{FF2B5EF4-FFF2-40B4-BE49-F238E27FC236}">
-                  <a16:creationId xmlns:a16="http://schemas.microsoft.com/office/drawing/2014/main" id="{F61ED42D-20E2-2645-0363-28E8F74E0675}"/>
-                </a:ext>
-              </a:extLst>
-            </p:cNvPr>
-            <p:cNvCxnSpPr/>
-            <p:nvPr/>
-          </p:nvCxnSpPr>
-          <p:spPr>
-            <a:xfrm>
-              <a:off x="4703695" y="3590459"/>
-              <a:ext cx="180000" cy="0"/>
-            </a:xfrm>
-            <a:prstGeom prst="line">
-              <a:avLst/>
-            </a:prstGeom>
-            <a:ln w="38100">
-              <a:solidFill>
-                <a:schemeClr val="tx1"/>
-              </a:solidFill>
-            </a:ln>
-          </p:spPr>
-          <p:style>
-            <a:lnRef idx="2">
-              <a:schemeClr val="accent1"/>
-            </a:lnRef>
-            <a:fillRef idx="0">
-              <a:schemeClr val="accent1"/>
-            </a:fillRef>
-            <a:effectRef idx="1">
-              <a:schemeClr val="accent1"/>
-            </a:effectRef>
-            <a:fontRef idx="minor">
-              <a:schemeClr val="tx1"/>
-            </a:fontRef>
-          </p:style>
-        </p:cxnSp>
-        <p:cxnSp>
-          <p:nvCxnSpPr>
-            <p:cNvPr id="11" name="Straight Connector 10">
-              <a:extLst>
-                <a:ext uri="{FF2B5EF4-FFF2-40B4-BE49-F238E27FC236}">
-                  <a16:creationId xmlns:a16="http://schemas.microsoft.com/office/drawing/2014/main" id="{E46CE380-FE0A-C93F-87A2-7659D06754F6}"/>
-                </a:ext>
-              </a:extLst>
-            </p:cNvPr>
-            <p:cNvCxnSpPr>
-              <a:cxnSpLocks/>
-            </p:cNvCxnSpPr>
-            <p:nvPr/>
-          </p:nvCxnSpPr>
-          <p:spPr>
-            <a:xfrm rot="16200000">
-              <a:off x="4704653" y="3593943"/>
-              <a:ext cx="180000" cy="0"/>
-            </a:xfrm>
-            <a:prstGeom prst="line">
-              <a:avLst/>
-            </a:prstGeom>
-            <a:ln w="38100">
-              <a:solidFill>
-                <a:schemeClr val="tx1"/>
-              </a:solidFill>
-            </a:ln>
-          </p:spPr>
-          <p:style>
-            <a:lnRef idx="2">
-              <a:schemeClr val="accent1"/>
-            </a:lnRef>
-            <a:fillRef idx="0">
-              <a:schemeClr val="accent1"/>
-            </a:fillRef>
-            <a:effectRef idx="1">
-              <a:schemeClr val="accent1"/>
-            </a:effectRef>
-            <a:fontRef idx="minor">
-              <a:schemeClr val="tx1"/>
-            </a:fontRef>
-          </p:style>
-        </p:cxnSp>
-        <p:cxnSp>
-          <p:nvCxnSpPr>
-            <p:cNvPr id="12" name="Straight Connector 11">
-              <a:extLst>
-                <a:ext uri="{FF2B5EF4-FFF2-40B4-BE49-F238E27FC236}">
-                  <a16:creationId xmlns:a16="http://schemas.microsoft.com/office/drawing/2014/main" id="{5F718451-1138-9200-2E9B-64291E7120D6}"/>
-                </a:ext>
-              </a:extLst>
-            </p:cNvPr>
-            <p:cNvCxnSpPr/>
-            <p:nvPr/>
-          </p:nvCxnSpPr>
-          <p:spPr>
-            <a:xfrm>
-              <a:off x="4697509" y="4044704"/>
-              <a:ext cx="180000" cy="0"/>
-            </a:xfrm>
-            <a:prstGeom prst="line">
-              <a:avLst/>
-            </a:prstGeom>
-            <a:ln w="38100">
-              <a:solidFill>
-                <a:schemeClr val="tx1"/>
-              </a:solidFill>
-            </a:ln>
-          </p:spPr>
-          <p:style>
-            <a:lnRef idx="2">
-              <a:schemeClr val="accent1"/>
-            </a:lnRef>
-            <a:fillRef idx="0">
-              <a:schemeClr val="accent1"/>
-            </a:fillRef>
-            <a:effectRef idx="1">
-              <a:schemeClr val="accent1"/>
-            </a:effectRef>
-            <a:fontRef idx="minor">
-              <a:schemeClr val="tx1"/>
-            </a:fontRef>
-          </p:style>
-        </p:cxnSp>
-        <p:cxnSp>
-          <p:nvCxnSpPr>
-            <p:cNvPr id="13" name="Straight Connector 12">
-              <a:extLst>
-                <a:ext uri="{FF2B5EF4-FFF2-40B4-BE49-F238E27FC236}">
-                  <a16:creationId xmlns:a16="http://schemas.microsoft.com/office/drawing/2014/main" id="{8DD9BEB5-1AAC-6C15-3DAD-958191D553D2}"/>
-                </a:ext>
-              </a:extLst>
-            </p:cNvPr>
-            <p:cNvCxnSpPr>
-              <a:cxnSpLocks/>
-            </p:cNvCxnSpPr>
-            <p:nvPr/>
-          </p:nvCxnSpPr>
-          <p:spPr>
-            <a:xfrm rot="16200000">
-              <a:off x="4696465" y="4044704"/>
-              <a:ext cx="180000" cy="0"/>
-            </a:xfrm>
-            <a:prstGeom prst="line">
-              <a:avLst/>
-            </a:prstGeom>
-            <a:ln w="38100">
-              <a:solidFill>
-                <a:schemeClr val="tx1"/>
-              </a:solidFill>
-            </a:ln>
-          </p:spPr>
-          <p:style>
-            <a:lnRef idx="2">
-              <a:schemeClr val="accent1"/>
-            </a:lnRef>
-            <a:fillRef idx="0">
-              <a:schemeClr val="accent1"/>
-            </a:fillRef>
-            <a:effectRef idx="1">
-              <a:schemeClr val="accent1"/>
-            </a:effectRef>
-            <a:fontRef idx="minor">
-              <a:schemeClr val="tx1"/>
-            </a:fontRef>
-          </p:style>
-        </p:cxnSp>
-        <p:cxnSp>
-          <p:nvCxnSpPr>
-            <p:cNvPr id="14" name="Straight Arrow Connector 13">
-              <a:extLst>
-                <a:ext uri="{FF2B5EF4-FFF2-40B4-BE49-F238E27FC236}">
-                  <a16:creationId xmlns:a16="http://schemas.microsoft.com/office/drawing/2014/main" id="{BF51B4B7-7899-224E-39DC-F8D3BBC5E248}"/>
-                </a:ext>
-              </a:extLst>
-            </p:cNvPr>
-            <p:cNvCxnSpPr>
-              <a:cxnSpLocks/>
-              <a:stCxn id="7" idx="3"/>
-              <a:endCxn id="8" idx="2"/>
-            </p:cNvCxnSpPr>
-            <p:nvPr/>
-          </p:nvCxnSpPr>
-          <p:spPr>
-            <a:xfrm flipV="1">
-              <a:off x="4454082" y="3837630"/>
-              <a:ext cx="360328" cy="1"/>
-            </a:xfrm>
-            <a:prstGeom prst="straightConnector1">
-              <a:avLst/>
-            </a:prstGeom>
-            <a:ln w="38100">
-              <a:tailEnd type="triangle"/>
-            </a:ln>
-          </p:spPr>
-          <p:style>
-            <a:lnRef idx="2">
-              <a:schemeClr val="accent1"/>
-            </a:lnRef>
-            <a:fillRef idx="0">
-              <a:schemeClr val="accent1"/>
-            </a:fillRef>
-            <a:effectRef idx="1">
-              <a:schemeClr val="accent1"/>
-            </a:effectRef>
-            <a:fontRef idx="minor">
-              <a:schemeClr val="tx1"/>
-            </a:fontRef>
-          </p:style>
-        </p:cxnSp>
-        <p:cxnSp>
-          <p:nvCxnSpPr>
-            <p:cNvPr id="15" name="Straight Arrow Connector 14">
-              <a:extLst>
-                <a:ext uri="{FF2B5EF4-FFF2-40B4-BE49-F238E27FC236}">
-                  <a16:creationId xmlns:a16="http://schemas.microsoft.com/office/drawing/2014/main" id="{7C456985-7972-4A55-A0C9-E3C7B507E7D2}"/>
-                </a:ext>
-              </a:extLst>
-            </p:cNvPr>
-            <p:cNvCxnSpPr>
-              <a:cxnSpLocks/>
-              <a:stCxn id="8" idx="4"/>
-              <a:endCxn id="6" idx="0"/>
-            </p:cNvCxnSpPr>
-            <p:nvPr/>
-          </p:nvCxnSpPr>
-          <p:spPr>
-            <a:xfrm>
-              <a:off x="4994410" y="4017630"/>
-              <a:ext cx="0" cy="902494"/>
-            </a:xfrm>
-            <a:prstGeom prst="straightConnector1">
-              <a:avLst/>
-            </a:prstGeom>
-            <a:ln w="38100">
-              <a:tailEnd type="triangle"/>
-            </a:ln>
-          </p:spPr>
-          <p:style>
-            <a:lnRef idx="2">
-              <a:schemeClr val="accent1"/>
-            </a:lnRef>
-            <a:fillRef idx="0">
-              <a:schemeClr val="accent1"/>
-            </a:fillRef>
-            <a:effectRef idx="1">
-              <a:schemeClr val="accent1"/>
-            </a:effectRef>
-            <a:fontRef idx="minor">
-              <a:schemeClr val="tx1"/>
-            </a:fontRef>
-          </p:style>
-        </p:cxnSp>
-        <p:cxnSp>
-          <p:nvCxnSpPr>
-            <p:cNvPr id="16" name="Straight Arrow Connector 15">
-              <a:extLst>
-                <a:ext uri="{FF2B5EF4-FFF2-40B4-BE49-F238E27FC236}">
-                  <a16:creationId xmlns:a16="http://schemas.microsoft.com/office/drawing/2014/main" id="{B3E37948-BAC5-BC12-C11E-16C6948B5A1B}"/>
-                </a:ext>
-              </a:extLst>
-            </p:cNvPr>
-            <p:cNvCxnSpPr>
-              <a:cxnSpLocks/>
-              <a:stCxn id="9" idx="6"/>
-              <a:endCxn id="7" idx="1"/>
-            </p:cNvCxnSpPr>
-            <p:nvPr/>
-          </p:nvCxnSpPr>
-          <p:spPr>
-            <a:xfrm>
-              <a:off x="2702803" y="3837630"/>
-              <a:ext cx="901287" cy="1"/>
-            </a:xfrm>
-            <a:prstGeom prst="straightConnector1">
-              <a:avLst/>
-            </a:prstGeom>
-            <a:ln w="38100">
-              <a:tailEnd type="triangle"/>
-            </a:ln>
-          </p:spPr>
-          <p:style>
-            <a:lnRef idx="2">
-              <a:schemeClr val="accent1"/>
-            </a:lnRef>
-            <a:fillRef idx="0">
-              <a:schemeClr val="accent1"/>
-            </a:fillRef>
-            <a:effectRef idx="1">
-              <a:schemeClr val="accent1"/>
-            </a:effectRef>
-            <a:fontRef idx="minor">
-              <a:schemeClr val="tx1"/>
-            </a:fontRef>
-          </p:style>
-        </p:cxnSp>
-        <p:cxnSp>
-          <p:nvCxnSpPr>
-            <p:cNvPr id="17" name="Straight Arrow Connector 16">
-              <a:extLst>
-                <a:ext uri="{FF2B5EF4-FFF2-40B4-BE49-F238E27FC236}">
-                  <a16:creationId xmlns:a16="http://schemas.microsoft.com/office/drawing/2014/main" id="{0DC6CFB9-29C3-E3FB-CD43-D78F072885A6}"/>
-                </a:ext>
-              </a:extLst>
-            </p:cNvPr>
-            <p:cNvCxnSpPr>
-              <a:cxnSpLocks/>
-              <a:stCxn id="6" idx="1"/>
-              <a:endCxn id="5" idx="3"/>
-            </p:cNvCxnSpPr>
-            <p:nvPr/>
-          </p:nvCxnSpPr>
-          <p:spPr>
-            <a:xfrm flipH="1">
-              <a:off x="3910751" y="5371220"/>
-              <a:ext cx="636920" cy="0"/>
-            </a:xfrm>
-            <a:prstGeom prst="straightConnector1">
-              <a:avLst/>
-            </a:prstGeom>
-            <a:ln w="38100">
-              <a:tailEnd type="triangle"/>
-            </a:ln>
-          </p:spPr>
-          <p:style>
-            <a:lnRef idx="2">
-              <a:schemeClr val="accent1"/>
-            </a:lnRef>
-            <a:fillRef idx="0">
-              <a:schemeClr val="accent1"/>
-            </a:fillRef>
-            <a:effectRef idx="1">
-              <a:schemeClr val="accent1"/>
-            </a:effectRef>
-            <a:fontRef idx="minor">
-              <a:schemeClr val="tx1"/>
-            </a:fontRef>
-          </p:style>
-        </p:cxnSp>
-        <p:cxnSp>
-          <p:nvCxnSpPr>
-            <p:cNvPr id="18" name="Connector: Elbow 17">
-              <a:extLst>
-                <a:ext uri="{FF2B5EF4-FFF2-40B4-BE49-F238E27FC236}">
-                  <a16:creationId xmlns:a16="http://schemas.microsoft.com/office/drawing/2014/main" id="{750D5B81-8DC6-E3EA-B33A-C10905CABE01}"/>
-                </a:ext>
-              </a:extLst>
-            </p:cNvPr>
-            <p:cNvCxnSpPr>
-              <a:cxnSpLocks/>
-              <a:stCxn id="4" idx="3"/>
-              <a:endCxn id="8" idx="0"/>
-            </p:cNvCxnSpPr>
-            <p:nvPr/>
-          </p:nvCxnSpPr>
-          <p:spPr>
-            <a:xfrm>
-              <a:off x="4459453" y="2454929"/>
-              <a:ext cx="534957" cy="1202701"/>
-            </a:xfrm>
-            <a:prstGeom prst="bentConnector2">
-              <a:avLst/>
-            </a:prstGeom>
-            <a:ln w="38100">
-              <a:tailEnd type="triangle"/>
-            </a:ln>
-          </p:spPr>
-          <p:style>
-            <a:lnRef idx="2">
-              <a:schemeClr val="accent1"/>
-            </a:lnRef>
-            <a:fillRef idx="0">
-              <a:schemeClr val="accent1"/>
-            </a:fillRef>
-            <a:effectRef idx="1">
-              <a:schemeClr val="accent1"/>
-            </a:effectRef>
-            <a:fontRef idx="minor">
-              <a:schemeClr val="tx1"/>
-            </a:fontRef>
-          </p:style>
-        </p:cxnSp>
-        <p:sp>
-          <p:nvSpPr>
-            <p:cNvPr id="19" name="Rectangle 18">
-              <a:extLst>
-                <a:ext uri="{FF2B5EF4-FFF2-40B4-BE49-F238E27FC236}">
-                  <a16:creationId xmlns:a16="http://schemas.microsoft.com/office/drawing/2014/main" id="{54820EA8-1EF1-F34F-46D0-D2FBF5388085}"/>
-                </a:ext>
-              </a:extLst>
-            </p:cNvPr>
-            <p:cNvSpPr/>
-            <p:nvPr/>
-          </p:nvSpPr>
-          <p:spPr>
-            <a:xfrm>
-              <a:off x="162615" y="2003833"/>
-              <a:ext cx="1232214" cy="2284894"/>
-            </a:xfrm>
-            <a:prstGeom prst="rect">
-              <a:avLst/>
-            </a:prstGeom>
-          </p:spPr>
-          <p:style>
-            <a:lnRef idx="2">
-              <a:schemeClr val="accent1">
-                <a:shade val="15000"/>
-              </a:schemeClr>
-            </a:lnRef>
-            <a:fillRef idx="1">
-              <a:schemeClr val="accent1"/>
-            </a:fillRef>
-            <a:effectRef idx="0">
-              <a:schemeClr val="accent1"/>
-            </a:effectRef>
-            <a:fontRef idx="minor">
-              <a:schemeClr val="lt1"/>
-            </a:fontRef>
-          </p:style>
-          <p:txBody>
-            <a:bodyPr rtlCol="0" anchor="ctr"/>
-            <a:lstStyle/>
-            <a:p>
-              <a:pPr algn="ctr"/>
-              <a:r>
-                <a:rPr lang="nb-NO" dirty="0"/>
-                <a:t>Referance</a:t>
-              </a:r>
-              <a:endParaRPr lang="en-GB" dirty="0"/>
-            </a:p>
-          </p:txBody>
-        </p:sp>
-        <p:cxnSp>
-          <p:nvCxnSpPr>
-            <p:cNvPr id="20" name="Straight Arrow Connector 19">
-              <a:extLst>
-                <a:ext uri="{FF2B5EF4-FFF2-40B4-BE49-F238E27FC236}">
-                  <a16:creationId xmlns:a16="http://schemas.microsoft.com/office/drawing/2014/main" id="{F7035C13-78F3-2595-18B3-6AA1E517A310}"/>
-                </a:ext>
-              </a:extLst>
-            </p:cNvPr>
-            <p:cNvCxnSpPr>
-              <a:cxnSpLocks/>
-              <a:endCxn id="9" idx="2"/>
-            </p:cNvCxnSpPr>
-            <p:nvPr/>
-          </p:nvCxnSpPr>
-          <p:spPr>
-            <a:xfrm>
-              <a:off x="1414585" y="3828851"/>
-              <a:ext cx="928218" cy="8779"/>
-            </a:xfrm>
-            <a:prstGeom prst="straightConnector1">
-              <a:avLst/>
-            </a:prstGeom>
-            <a:ln w="38100">
-              <a:tailEnd type="triangle"/>
-            </a:ln>
-          </p:spPr>
-          <p:style>
-            <a:lnRef idx="2">
-              <a:schemeClr val="accent1"/>
-            </a:lnRef>
-            <a:fillRef idx="0">
-              <a:schemeClr val="accent1"/>
-            </a:fillRef>
-            <a:effectRef idx="1">
-              <a:schemeClr val="accent1"/>
-            </a:effectRef>
-            <a:fontRef idx="minor">
-              <a:schemeClr val="tx1"/>
-            </a:fontRef>
-          </p:style>
-        </p:cxnSp>
-        <p:cxnSp>
-          <p:nvCxnSpPr>
-            <p:cNvPr id="21" name="Straight Arrow Connector 20">
-              <a:extLst>
-                <a:ext uri="{FF2B5EF4-FFF2-40B4-BE49-F238E27FC236}">
-                  <a16:creationId xmlns:a16="http://schemas.microsoft.com/office/drawing/2014/main" id="{9A81141A-640E-2FFC-CAF1-C9FE4B4C6F4D}"/>
-                </a:ext>
-              </a:extLst>
-            </p:cNvPr>
-            <p:cNvCxnSpPr>
-              <a:cxnSpLocks/>
-              <a:endCxn id="4" idx="1"/>
-            </p:cNvCxnSpPr>
-            <p:nvPr/>
-          </p:nvCxnSpPr>
-          <p:spPr>
-            <a:xfrm>
-              <a:off x="1150059" y="2454929"/>
-              <a:ext cx="2077181" cy="0"/>
-            </a:xfrm>
-            <a:prstGeom prst="straightConnector1">
-              <a:avLst/>
-            </a:prstGeom>
-            <a:ln w="38100">
-              <a:tailEnd type="triangle"/>
-            </a:ln>
-          </p:spPr>
-          <p:style>
-            <a:lnRef idx="2">
-              <a:schemeClr val="accent1"/>
-            </a:lnRef>
-            <a:fillRef idx="0">
-              <a:schemeClr val="accent1"/>
-            </a:fillRef>
-            <a:effectRef idx="1">
-              <a:schemeClr val="accent1"/>
-            </a:effectRef>
-            <a:fontRef idx="minor">
-              <a:schemeClr val="tx1"/>
-            </a:fontRef>
-          </p:style>
-        </p:cxnSp>
-        <p:cxnSp>
-          <p:nvCxnSpPr>
-            <p:cNvPr id="22" name="Connector: Elbow 21">
-              <a:extLst>
-                <a:ext uri="{FF2B5EF4-FFF2-40B4-BE49-F238E27FC236}">
-                  <a16:creationId xmlns:a16="http://schemas.microsoft.com/office/drawing/2014/main" id="{12382DFE-24DE-686B-D81E-C3DAE9093C0C}"/>
-                </a:ext>
-              </a:extLst>
-            </p:cNvPr>
-            <p:cNvCxnSpPr>
-              <a:cxnSpLocks/>
-              <a:stCxn id="5" idx="1"/>
-              <a:endCxn id="9" idx="4"/>
-            </p:cNvCxnSpPr>
-            <p:nvPr/>
-          </p:nvCxnSpPr>
-          <p:spPr>
-            <a:xfrm rot="10800000">
-              <a:off x="2522803" y="4017630"/>
-              <a:ext cx="437738" cy="1353590"/>
-            </a:xfrm>
-            <a:prstGeom prst="bentConnector2">
-              <a:avLst/>
-            </a:prstGeom>
-            <a:ln w="38100">
-              <a:tailEnd type="triangle"/>
-            </a:ln>
-          </p:spPr>
-          <p:style>
-            <a:lnRef idx="2">
-              <a:schemeClr val="accent1"/>
-            </a:lnRef>
-            <a:fillRef idx="0">
-              <a:schemeClr val="accent1"/>
-            </a:fillRef>
-            <a:effectRef idx="1">
-              <a:schemeClr val="accent1"/>
-            </a:effectRef>
-            <a:fontRef idx="minor">
-              <a:schemeClr val="tx1"/>
-            </a:fontRef>
-          </p:style>
-        </p:cxnSp>
-        <p:cxnSp>
-          <p:nvCxnSpPr>
-            <p:cNvPr id="24" name="Straight Connector 23">
-              <a:extLst>
-                <a:ext uri="{FF2B5EF4-FFF2-40B4-BE49-F238E27FC236}">
-                  <a16:creationId xmlns:a16="http://schemas.microsoft.com/office/drawing/2014/main" id="{DA209A58-C37E-7109-ADB2-E8F69F9D2AFA}"/>
-                </a:ext>
-              </a:extLst>
-            </p:cNvPr>
-            <p:cNvCxnSpPr/>
-            <p:nvPr/>
-          </p:nvCxnSpPr>
-          <p:spPr>
-            <a:xfrm>
-              <a:off x="2175940" y="3657630"/>
-              <a:ext cx="180000" cy="0"/>
-            </a:xfrm>
-            <a:prstGeom prst="line">
-              <a:avLst/>
-            </a:prstGeom>
-            <a:ln w="38100">
-              <a:solidFill>
-                <a:schemeClr val="tx1"/>
-              </a:solidFill>
-            </a:ln>
-          </p:spPr>
-          <p:style>
-            <a:lnRef idx="2">
-              <a:schemeClr val="accent1"/>
-            </a:lnRef>
-            <a:fillRef idx="0">
-              <a:schemeClr val="accent1"/>
-            </a:fillRef>
-            <a:effectRef idx="1">
-              <a:schemeClr val="accent1"/>
-            </a:effectRef>
-            <a:fontRef idx="minor">
-              <a:schemeClr val="tx1"/>
-            </a:fontRef>
-          </p:style>
-        </p:cxnSp>
-        <p:cxnSp>
-          <p:nvCxnSpPr>
-            <p:cNvPr id="25" name="Straight Connector 24">
-              <a:extLst>
-                <a:ext uri="{FF2B5EF4-FFF2-40B4-BE49-F238E27FC236}">
-                  <a16:creationId xmlns:a16="http://schemas.microsoft.com/office/drawing/2014/main" id="{A7471B7C-BB1B-9DD8-B137-84F4C129D76C}"/>
-                </a:ext>
-              </a:extLst>
-            </p:cNvPr>
-            <p:cNvCxnSpPr>
-              <a:cxnSpLocks/>
-            </p:cNvCxnSpPr>
-            <p:nvPr/>
-          </p:nvCxnSpPr>
-          <p:spPr>
-            <a:xfrm rot="16200000">
-              <a:off x="2174896" y="3657630"/>
-              <a:ext cx="180000" cy="0"/>
-            </a:xfrm>
-            <a:prstGeom prst="line">
-              <a:avLst/>
-            </a:prstGeom>
-            <a:ln w="38100">
-              <a:solidFill>
-                <a:schemeClr val="tx1"/>
-              </a:solidFill>
-            </a:ln>
-          </p:spPr>
-          <p:style>
-            <a:lnRef idx="2">
-              <a:schemeClr val="accent1"/>
-            </a:lnRef>
-            <a:fillRef idx="0">
-              <a:schemeClr val="accent1"/>
-            </a:fillRef>
-            <a:effectRef idx="1">
-              <a:schemeClr val="accent1"/>
-            </a:effectRef>
-            <a:fontRef idx="minor">
-              <a:schemeClr val="tx1"/>
-            </a:fontRef>
-          </p:style>
-        </p:cxnSp>
-        <p:cxnSp>
-          <p:nvCxnSpPr>
-            <p:cNvPr id="26" name="Straight Connector 25">
-              <a:extLst>
-                <a:ext uri="{FF2B5EF4-FFF2-40B4-BE49-F238E27FC236}">
-                  <a16:creationId xmlns:a16="http://schemas.microsoft.com/office/drawing/2014/main" id="{2227EEC6-FEF7-41DA-C44F-4CA13A03BA6A}"/>
-                </a:ext>
-              </a:extLst>
-            </p:cNvPr>
-            <p:cNvCxnSpPr/>
-            <p:nvPr/>
-          </p:nvCxnSpPr>
-          <p:spPr>
-            <a:xfrm>
-              <a:off x="2671240" y="4047574"/>
-              <a:ext cx="180000" cy="0"/>
-            </a:xfrm>
-            <a:prstGeom prst="line">
-              <a:avLst/>
-            </a:prstGeom>
-            <a:ln w="38100">
-              <a:solidFill>
-                <a:schemeClr val="tx1"/>
-              </a:solidFill>
-            </a:ln>
-          </p:spPr>
-          <p:style>
-            <a:lnRef idx="2">
-              <a:schemeClr val="accent1"/>
-            </a:lnRef>
-            <a:fillRef idx="0">
-              <a:schemeClr val="accent1"/>
-            </a:fillRef>
-            <a:effectRef idx="1">
-              <a:schemeClr val="accent1"/>
-            </a:effectRef>
-            <a:fontRef idx="minor">
-              <a:schemeClr val="tx1"/>
-            </a:fontRef>
-          </p:style>
-        </p:cxnSp>
-        <mc:AlternateContent xmlns:mc="http://schemas.openxmlformats.org/markup-compatibility/2006" xmlns:a14="http://schemas.microsoft.com/office/drawing/2010/main">
-          <mc:Choice Requires="a14">
-            <p:sp>
-              <p:nvSpPr>
-                <p:cNvPr id="33" name="TextBox 32">
-                  <a:extLst>
-                    <a:ext uri="{FF2B5EF4-FFF2-40B4-BE49-F238E27FC236}">
-                      <a16:creationId xmlns:a16="http://schemas.microsoft.com/office/drawing/2014/main" id="{7E6C4752-480D-BFEC-7961-A01EDECB44A9}"/>
-                    </a:ext>
-                  </a:extLst>
-                </p:cNvPr>
-                <p:cNvSpPr txBox="1"/>
-                <p:nvPr/>
-              </p:nvSpPr>
-              <p:spPr>
-                <a:xfrm>
-                  <a:off x="1365593" y="3858795"/>
-                  <a:ext cx="895181" cy="391582"/>
-                </a:xfrm>
-                <a:prstGeom prst="rect">
-                  <a:avLst/>
-                </a:prstGeom>
-                <a:noFill/>
-              </p:spPr>
-              <p:txBody>
-                <a:bodyPr wrap="none" rtlCol="0">
-                  <a:spAutoFit/>
-                </a:bodyPr>
-                <a:lstStyle/>
-                <a:p>
-                  <a:pPr/>
-                  <a14:m>
-                    <m:oMathPara xmlns:m="http://schemas.openxmlformats.org/officeDocument/2006/math">
-                      <m:oMathParaPr>
-                        <m:jc m:val="centerGroup"/>
-                      </m:oMathParaPr>
-                      <m:oMath xmlns:m="http://schemas.openxmlformats.org/officeDocument/2006/math">
-                        <m:sSub>
-                          <m:sSubPr>
-                            <m:ctrlPr>
-                              <a:rPr lang="nb-NO" b="0" i="1" smtClean="0">
-                                <a:latin typeface="Cambria Math" panose="02040503050406030204" pitchFamily="18" charset="0"/>
-                              </a:rPr>
-                            </m:ctrlPr>
-                          </m:sSubPr>
-                          <m:e>
-                            <m:r>
-                              <a:rPr lang="nb-NO" b="0" i="1" smtClean="0">
-                                <a:latin typeface="Cambria Math" panose="02040503050406030204" pitchFamily="18" charset="0"/>
-                              </a:rPr>
-                              <m:t>𝑃𝑜𝑠</m:t>
-                            </m:r>
-                          </m:e>
-                          <m:sub>
-                            <m:r>
-                              <a:rPr lang="nb-NO" b="0" i="1" smtClean="0">
-                                <a:latin typeface="Cambria Math" panose="02040503050406030204" pitchFamily="18" charset="0"/>
-                              </a:rPr>
-                              <m:t>𝑟𝑒𝑓</m:t>
-                            </m:r>
-                          </m:sub>
-                        </m:sSub>
-                      </m:oMath>
-                    </m:oMathPara>
-                  </a14:m>
-                  <a:endParaRPr lang="en-GB" dirty="0"/>
-                </a:p>
-              </p:txBody>
-            </p:sp>
-          </mc:Choice>
-          <mc:Fallback xmlns="">
-            <p:sp>
-              <p:nvSpPr>
-                <p:cNvPr id="33" name="TextBox 32">
-                  <a:extLst>
-                    <a:ext uri="{FF2B5EF4-FFF2-40B4-BE49-F238E27FC236}">
-                      <a16:creationId xmlns:a16="http://schemas.microsoft.com/office/drawing/2014/main" id="{7E6C4752-480D-BFEC-7961-A01EDECB44A9}"/>
-                    </a:ext>
-                  </a:extLst>
-                </p:cNvPr>
-                <p:cNvSpPr txBox="1">
-                  <a:spLocks noRot="1" noChangeAspect="1" noMove="1" noResize="1" noEditPoints="1" noAdjustHandles="1" noChangeArrowheads="1" noChangeShapeType="1" noTextEdit="1"/>
-                </p:cNvSpPr>
-                <p:nvPr/>
-              </p:nvSpPr>
-              <p:spPr>
-                <a:xfrm>
-                  <a:off x="1365593" y="3858795"/>
-                  <a:ext cx="895181" cy="391582"/>
-                </a:xfrm>
-                <a:prstGeom prst="rect">
-                  <a:avLst/>
-                </a:prstGeom>
-                <a:blipFill>
-                  <a:blip r:embed="rId2"/>
-                  <a:stretch>
-                    <a:fillRect b="-9375"/>
-                  </a:stretch>
-                </a:blipFill>
-              </p:spPr>
-              <p:txBody>
-                <a:bodyPr/>
-                <a:lstStyle/>
-                <a:p>
-                  <a:r>
-                    <a:rPr lang="en-GB">
-                      <a:noFill/>
-                    </a:rPr>
-                    <a:t> </a:t>
-                  </a:r>
-                </a:p>
-              </p:txBody>
-            </p:sp>
-          </mc:Fallback>
-        </mc:AlternateContent>
-        <mc:AlternateContent xmlns:mc="http://schemas.openxmlformats.org/markup-compatibility/2006" xmlns:a14="http://schemas.microsoft.com/office/drawing/2010/main">
-          <mc:Choice Requires="a14">
-            <p:sp>
-              <p:nvSpPr>
-                <p:cNvPr id="34" name="TextBox 33">
-                  <a:extLst>
-                    <a:ext uri="{FF2B5EF4-FFF2-40B4-BE49-F238E27FC236}">
-                      <a16:creationId xmlns:a16="http://schemas.microsoft.com/office/drawing/2014/main" id="{1C3CC8F5-8410-9801-4BDC-CF877A7AF017}"/>
-                    </a:ext>
-                  </a:extLst>
-                </p:cNvPr>
-                <p:cNvSpPr txBox="1"/>
-                <p:nvPr/>
-              </p:nvSpPr>
-              <p:spPr>
-                <a:xfrm>
-                  <a:off x="5059680" y="2757959"/>
-                  <a:ext cx="394339" cy="369332"/>
-                </a:xfrm>
-                <a:prstGeom prst="rect">
-                  <a:avLst/>
-                </a:prstGeom>
-                <a:noFill/>
-              </p:spPr>
-              <p:txBody>
-                <a:bodyPr wrap="none" rtlCol="0">
-                  <a:spAutoFit/>
-                </a:bodyPr>
-                <a:lstStyle/>
-                <a:p>
-                  <a:pPr/>
-                  <a14:m>
-                    <m:oMathPara xmlns:m="http://schemas.openxmlformats.org/officeDocument/2006/math">
-                      <m:oMathParaPr>
-                        <m:jc m:val="centerGroup"/>
-                      </m:oMathParaPr>
-                      <m:oMath xmlns:m="http://schemas.openxmlformats.org/officeDocument/2006/math">
-                        <m:r>
-                          <a:rPr lang="nb-NO" b="0" i="1" smtClean="0">
-                            <a:latin typeface="Cambria Math" panose="02040503050406030204" pitchFamily="18" charset="0"/>
-                          </a:rPr>
-                          <m:t>𝑈</m:t>
-                        </m:r>
-                      </m:oMath>
-                    </m:oMathPara>
-                  </a14:m>
-                  <a:endParaRPr lang="en-GB" dirty="0"/>
-                </a:p>
-              </p:txBody>
-            </p:sp>
-          </mc:Choice>
-          <mc:Fallback xmlns="">
-            <p:sp>
-              <p:nvSpPr>
-                <p:cNvPr id="34" name="TextBox 33">
-                  <a:extLst>
-                    <a:ext uri="{FF2B5EF4-FFF2-40B4-BE49-F238E27FC236}">
-                      <a16:creationId xmlns:a16="http://schemas.microsoft.com/office/drawing/2014/main" id="{1C3CC8F5-8410-9801-4BDC-CF877A7AF017}"/>
-                    </a:ext>
-                  </a:extLst>
-                </p:cNvPr>
-                <p:cNvSpPr txBox="1">
-                  <a:spLocks noRot="1" noChangeAspect="1" noMove="1" noResize="1" noEditPoints="1" noAdjustHandles="1" noChangeArrowheads="1" noChangeShapeType="1" noTextEdit="1"/>
-                </p:cNvSpPr>
-                <p:nvPr/>
-              </p:nvSpPr>
-              <p:spPr>
-                <a:xfrm>
-                  <a:off x="5059680" y="2757959"/>
-                  <a:ext cx="394339" cy="369332"/>
-                </a:xfrm>
-                <a:prstGeom prst="rect">
-                  <a:avLst/>
-                </a:prstGeom>
-                <a:blipFill>
-                  <a:blip r:embed="rId3"/>
-                  <a:stretch>
-                    <a:fillRect/>
-                  </a:stretch>
-                </a:blipFill>
-              </p:spPr>
-              <p:txBody>
-                <a:bodyPr/>
-                <a:lstStyle/>
-                <a:p>
-                  <a:r>
-                    <a:rPr lang="en-GB">
-                      <a:noFill/>
-                    </a:rPr>
-                    <a:t> </a:t>
-                  </a:r>
-                </a:p>
-              </p:txBody>
-            </p:sp>
-          </mc:Fallback>
-        </mc:AlternateContent>
-        <mc:AlternateContent xmlns:mc="http://schemas.openxmlformats.org/markup-compatibility/2006" xmlns:a14="http://schemas.microsoft.com/office/drawing/2010/main">
-          <mc:Choice Requires="a14">
-            <p:sp>
-              <p:nvSpPr>
-                <p:cNvPr id="53" name="TextBox 52">
-                  <a:extLst>
-                    <a:ext uri="{FF2B5EF4-FFF2-40B4-BE49-F238E27FC236}">
-                      <a16:creationId xmlns:a16="http://schemas.microsoft.com/office/drawing/2014/main" id="{7BB7014E-056F-0BE9-B644-326BC6269B82}"/>
-                    </a:ext>
-                  </a:extLst>
-                </p:cNvPr>
-                <p:cNvSpPr txBox="1"/>
-                <p:nvPr/>
-              </p:nvSpPr>
-              <p:spPr>
-                <a:xfrm>
-                  <a:off x="2027297" y="2063346"/>
-                  <a:ext cx="857542" cy="391582"/>
-                </a:xfrm>
-                <a:prstGeom prst="rect">
-                  <a:avLst/>
-                </a:prstGeom>
-                <a:noFill/>
-              </p:spPr>
-              <p:txBody>
-                <a:bodyPr wrap="none" rtlCol="0">
-                  <a:spAutoFit/>
-                </a:bodyPr>
-                <a:lstStyle/>
-                <a:p>
-                  <a:pPr/>
-                  <a14:m>
-                    <m:oMathPara xmlns:m="http://schemas.openxmlformats.org/officeDocument/2006/math">
-                      <m:oMathParaPr>
-                        <m:jc m:val="centerGroup"/>
-                      </m:oMathParaPr>
-                      <m:oMath xmlns:m="http://schemas.openxmlformats.org/officeDocument/2006/math">
-                        <m:sSub>
-                          <m:sSubPr>
-                            <m:ctrlPr>
-                              <a:rPr lang="nb-NO" b="0" i="1" smtClean="0">
-                                <a:latin typeface="Cambria Math" panose="02040503050406030204" pitchFamily="18" charset="0"/>
-                              </a:rPr>
-                            </m:ctrlPr>
-                          </m:sSubPr>
-                          <m:e>
-                            <m:r>
-                              <a:rPr lang="nb-NO" b="0" i="1" smtClean="0">
-                                <a:latin typeface="Cambria Math" panose="02040503050406030204" pitchFamily="18" charset="0"/>
-                              </a:rPr>
-                              <m:t>𝑉𝑒𝑙</m:t>
-                            </m:r>
-                          </m:e>
-                          <m:sub>
-                            <m:r>
-                              <a:rPr lang="nb-NO" b="0" i="1" smtClean="0">
-                                <a:latin typeface="Cambria Math" panose="02040503050406030204" pitchFamily="18" charset="0"/>
-                              </a:rPr>
-                              <m:t>𝑟𝑒𝑓</m:t>
-                            </m:r>
-                          </m:sub>
-                        </m:sSub>
-                      </m:oMath>
-                    </m:oMathPara>
-                  </a14:m>
-                  <a:endParaRPr lang="en-GB" dirty="0"/>
-                </a:p>
-              </p:txBody>
-            </p:sp>
-          </mc:Choice>
-          <mc:Fallback xmlns="">
-            <p:sp>
-              <p:nvSpPr>
-                <p:cNvPr id="53" name="TextBox 52">
-                  <a:extLst>
-                    <a:ext uri="{FF2B5EF4-FFF2-40B4-BE49-F238E27FC236}">
-                      <a16:creationId xmlns:a16="http://schemas.microsoft.com/office/drawing/2014/main" id="{7BB7014E-056F-0BE9-B644-326BC6269B82}"/>
-                    </a:ext>
-                  </a:extLst>
-                </p:cNvPr>
-                <p:cNvSpPr txBox="1">
-                  <a:spLocks noRot="1" noChangeAspect="1" noMove="1" noResize="1" noEditPoints="1" noAdjustHandles="1" noChangeArrowheads="1" noChangeShapeType="1" noTextEdit="1"/>
-                </p:cNvSpPr>
-                <p:nvPr/>
-              </p:nvSpPr>
-              <p:spPr>
-                <a:xfrm>
-                  <a:off x="2027297" y="2063346"/>
-                  <a:ext cx="857542" cy="391582"/>
-                </a:xfrm>
-                <a:prstGeom prst="rect">
-                  <a:avLst/>
-                </a:prstGeom>
-                <a:blipFill>
-                  <a:blip r:embed="rId4"/>
-                  <a:stretch>
-                    <a:fillRect b="-9231"/>
-                  </a:stretch>
-                </a:blipFill>
-              </p:spPr>
-              <p:txBody>
-                <a:bodyPr/>
-                <a:lstStyle/>
-                <a:p>
-                  <a:r>
-                    <a:rPr lang="en-GB">
-                      <a:noFill/>
-                    </a:rPr>
-                    <a:t> </a:t>
-                  </a:r>
-                </a:p>
-              </p:txBody>
-            </p:sp>
-          </mc:Fallback>
-        </mc:AlternateContent>
-        <mc:AlternateContent xmlns:mc="http://schemas.openxmlformats.org/markup-compatibility/2006" xmlns:a14="http://schemas.microsoft.com/office/drawing/2010/main">
-          <mc:Choice Requires="a14">
-            <p:sp>
-              <p:nvSpPr>
-                <p:cNvPr id="56" name="TextBox 55">
-                  <a:extLst>
-                    <a:ext uri="{FF2B5EF4-FFF2-40B4-BE49-F238E27FC236}">
-                      <a16:creationId xmlns:a16="http://schemas.microsoft.com/office/drawing/2014/main" id="{7BCD7082-F1F8-BFC5-6AEC-C6D0973F03A8}"/>
-                    </a:ext>
-                  </a:extLst>
-                </p:cNvPr>
-                <p:cNvSpPr txBox="1"/>
-                <p:nvPr/>
-              </p:nvSpPr>
-              <p:spPr>
-                <a:xfrm>
-                  <a:off x="1577522" y="5056829"/>
-                  <a:ext cx="960584" cy="369332"/>
-                </a:xfrm>
-                <a:prstGeom prst="rect">
-                  <a:avLst/>
-                </a:prstGeom>
-                <a:noFill/>
-              </p:spPr>
-              <p:txBody>
-                <a:bodyPr wrap="none" rtlCol="0">
-                  <a:spAutoFit/>
-                </a:bodyPr>
-                <a:lstStyle/>
-                <a:p>
-                  <a:pPr/>
-                  <a14:m>
-                    <m:oMathPara xmlns:m="http://schemas.openxmlformats.org/officeDocument/2006/math">
-                      <m:oMathParaPr>
-                        <m:jc m:val="centerGroup"/>
-                      </m:oMathParaPr>
-                      <m:oMath xmlns:m="http://schemas.openxmlformats.org/officeDocument/2006/math">
-                        <m:sSub>
-                          <m:sSubPr>
-                            <m:ctrlPr>
-                              <a:rPr lang="nb-NO" b="0" i="1" smtClean="0">
-                                <a:latin typeface="Cambria Math" panose="02040503050406030204" pitchFamily="18" charset="0"/>
-                              </a:rPr>
-                            </m:ctrlPr>
-                          </m:sSubPr>
-                          <m:e>
-                            <m:r>
-                              <a:rPr lang="nb-NO" b="0" i="1" smtClean="0">
-                                <a:latin typeface="Cambria Math" panose="02040503050406030204" pitchFamily="18" charset="0"/>
-                              </a:rPr>
-                              <m:t>𝑃𝑜𝑠</m:t>
-                            </m:r>
-                          </m:e>
-                          <m:sub>
-                            <m:r>
-                              <a:rPr lang="nb-NO" b="0" i="1" smtClean="0">
-                                <a:latin typeface="Cambria Math" panose="02040503050406030204" pitchFamily="18" charset="0"/>
-                              </a:rPr>
-                              <m:t>𝑟𝑒𝑎𝑙</m:t>
-                            </m:r>
-                          </m:sub>
-                        </m:sSub>
-                      </m:oMath>
-                    </m:oMathPara>
-                  </a14:m>
-                  <a:endParaRPr lang="en-GB" dirty="0"/>
-                </a:p>
-              </p:txBody>
-            </p:sp>
-          </mc:Choice>
-          <mc:Fallback xmlns="">
-            <p:sp>
-              <p:nvSpPr>
-                <p:cNvPr id="56" name="TextBox 55">
-                  <a:extLst>
-                    <a:ext uri="{FF2B5EF4-FFF2-40B4-BE49-F238E27FC236}">
-                      <a16:creationId xmlns:a16="http://schemas.microsoft.com/office/drawing/2014/main" id="{7BCD7082-F1F8-BFC5-6AEC-C6D0973F03A8}"/>
-                    </a:ext>
-                  </a:extLst>
-                </p:cNvPr>
-                <p:cNvSpPr txBox="1">
-                  <a:spLocks noRot="1" noChangeAspect="1" noMove="1" noResize="1" noEditPoints="1" noAdjustHandles="1" noChangeArrowheads="1" noChangeShapeType="1" noTextEdit="1"/>
-                </p:cNvSpPr>
-                <p:nvPr/>
-              </p:nvSpPr>
-              <p:spPr>
-                <a:xfrm>
-                  <a:off x="1577522" y="5056829"/>
-                  <a:ext cx="960584" cy="369332"/>
-                </a:xfrm>
-                <a:prstGeom prst="rect">
-                  <a:avLst/>
-                </a:prstGeom>
-                <a:blipFill>
-                  <a:blip r:embed="rId5"/>
-                  <a:stretch>
-                    <a:fillRect/>
-                  </a:stretch>
-                </a:blipFill>
-              </p:spPr>
-              <p:txBody>
-                <a:bodyPr/>
-                <a:lstStyle/>
-                <a:p>
-                  <a:r>
-                    <a:rPr lang="en-GB">
-                      <a:noFill/>
-                    </a:rPr>
-                    <a:t> </a:t>
-                  </a:r>
-                </a:p>
-              </p:txBody>
-            </p:sp>
-          </mc:Fallback>
-        </mc:AlternateContent>
-        <mc:AlternateContent xmlns:mc="http://schemas.openxmlformats.org/markup-compatibility/2006" xmlns:a14="http://schemas.microsoft.com/office/drawing/2010/main">
-          <mc:Choice Requires="a14">
-            <p:sp>
-              <p:nvSpPr>
-                <p:cNvPr id="57" name="TextBox 56">
-                  <a:extLst>
-                    <a:ext uri="{FF2B5EF4-FFF2-40B4-BE49-F238E27FC236}">
-                      <a16:creationId xmlns:a16="http://schemas.microsoft.com/office/drawing/2014/main" id="{44E9C302-B0B7-1846-C44D-E16B9F668377}"/>
-                    </a:ext>
-                  </a:extLst>
-                </p:cNvPr>
-                <p:cNvSpPr txBox="1"/>
-                <p:nvPr/>
-              </p:nvSpPr>
-              <p:spPr>
-                <a:xfrm>
-                  <a:off x="2594578" y="3423290"/>
-                  <a:ext cx="1089978" cy="369332"/>
-                </a:xfrm>
-                <a:prstGeom prst="rect">
-                  <a:avLst/>
-                </a:prstGeom>
-                <a:noFill/>
-              </p:spPr>
-              <p:txBody>
-                <a:bodyPr wrap="none" rtlCol="0">
-                  <a:spAutoFit/>
-                </a:bodyPr>
-                <a:lstStyle/>
-                <a:p>
-                  <a:pPr/>
-                  <a14:m>
-                    <m:oMathPara xmlns:m="http://schemas.openxmlformats.org/officeDocument/2006/math">
-                      <m:oMathParaPr>
-                        <m:jc m:val="centerGroup"/>
-                      </m:oMathParaPr>
-                      <m:oMath xmlns:m="http://schemas.openxmlformats.org/officeDocument/2006/math">
-                        <m:sSub>
-                          <m:sSubPr>
-                            <m:ctrlPr>
-                              <a:rPr lang="nb-NO" b="0" i="1" smtClean="0">
-                                <a:latin typeface="Cambria Math" panose="02040503050406030204" pitchFamily="18" charset="0"/>
-                              </a:rPr>
-                            </m:ctrlPr>
-                          </m:sSubPr>
-                          <m:e>
-                            <m:r>
-                              <a:rPr lang="nb-NO" b="0" i="1" smtClean="0">
-                                <a:latin typeface="Cambria Math" panose="02040503050406030204" pitchFamily="18" charset="0"/>
-                              </a:rPr>
-                              <m:t>𝑃𝑜𝑠</m:t>
-                            </m:r>
-                          </m:e>
-                          <m:sub>
-                            <m:r>
-                              <a:rPr lang="nb-NO" b="0" i="1" smtClean="0">
-                                <a:latin typeface="Cambria Math" panose="02040503050406030204" pitchFamily="18" charset="0"/>
-                              </a:rPr>
-                              <m:t>𝐸𝑟𝑟𝑜𝑟</m:t>
-                            </m:r>
-                          </m:sub>
-                        </m:sSub>
-                      </m:oMath>
-                    </m:oMathPara>
-                  </a14:m>
-                  <a:endParaRPr lang="en-GB" dirty="0"/>
-                </a:p>
-              </p:txBody>
-            </p:sp>
-          </mc:Choice>
-          <mc:Fallback xmlns="">
-            <p:sp>
-              <p:nvSpPr>
-                <p:cNvPr id="57" name="TextBox 56">
-                  <a:extLst>
-                    <a:ext uri="{FF2B5EF4-FFF2-40B4-BE49-F238E27FC236}">
-                      <a16:creationId xmlns:a16="http://schemas.microsoft.com/office/drawing/2014/main" id="{44E9C302-B0B7-1846-C44D-E16B9F668377}"/>
-                    </a:ext>
-                  </a:extLst>
-                </p:cNvPr>
-                <p:cNvSpPr txBox="1">
-                  <a:spLocks noRot="1" noChangeAspect="1" noMove="1" noResize="1" noEditPoints="1" noAdjustHandles="1" noChangeArrowheads="1" noChangeShapeType="1" noTextEdit="1"/>
-                </p:cNvSpPr>
-                <p:nvPr/>
-              </p:nvSpPr>
-              <p:spPr>
-                <a:xfrm>
-                  <a:off x="2594578" y="3423290"/>
-                  <a:ext cx="1089978" cy="369332"/>
-                </a:xfrm>
-                <a:prstGeom prst="rect">
-                  <a:avLst/>
-                </a:prstGeom>
-                <a:blipFill>
-                  <a:blip r:embed="rId6"/>
-                  <a:stretch>
-                    <a:fillRect/>
-                  </a:stretch>
-                </a:blipFill>
-              </p:spPr>
-              <p:txBody>
-                <a:bodyPr/>
-                <a:lstStyle/>
-                <a:p>
-                  <a:r>
-                    <a:rPr lang="en-GB">
-                      <a:noFill/>
-                    </a:rPr>
-                    <a:t> </a:t>
-                  </a:r>
-                </a:p>
-              </p:txBody>
-            </p:sp>
-          </mc:Fallback>
-        </mc:AlternateContent>
-      </p:grpSp>
       <p:grpSp>
         <p:nvGrpSpPr>
           <p:cNvPr id="90" name="Group 89">
@@ -6829,161 +5275,1736 @@
           </mc:Fallback>
         </mc:AlternateContent>
       </p:grpSp>
-      <p:cxnSp>
-        <p:nvCxnSpPr>
-          <p:cNvPr id="84" name="Connector: Elbow 83">
+      <p:grpSp>
+        <p:nvGrpSpPr>
+          <p:cNvPr id="3" name="Group 2">
             <a:extLst>
               <a:ext uri="{FF2B5EF4-FFF2-40B4-BE49-F238E27FC236}">
-                <a16:creationId xmlns:a16="http://schemas.microsoft.com/office/drawing/2014/main" id="{E91669A2-CDA3-C4EF-D565-BA815EA0FB1E}"/>
+                <a16:creationId xmlns:a16="http://schemas.microsoft.com/office/drawing/2014/main" id="{E64FA384-CA87-B5A8-F6F1-81F42ED6FCA2}"/>
               </a:ext>
             </a:extLst>
           </p:cNvPr>
-          <p:cNvCxnSpPr>
-            <a:cxnSpLocks/>
-            <a:stCxn id="5" idx="2"/>
-            <a:endCxn id="4" idx="0"/>
-          </p:cNvCxnSpPr>
+          <p:cNvGrpSpPr/>
           <p:nvPr/>
-        </p:nvCxnSpPr>
-        <p:spPr>
-          <a:xfrm rot="5400000" flipH="1" flipV="1">
-            <a:off x="1730255" y="3958143"/>
-            <a:ext cx="3818482" cy="407701"/>
+        </p:nvGrpSpPr>
+        <p:grpSpPr>
+          <a:xfrm>
+            <a:off x="162615" y="2252753"/>
+            <a:ext cx="5597515" cy="4387168"/>
+            <a:chOff x="162615" y="2252753"/>
+            <a:chExt cx="5597515" cy="4387168"/>
           </a:xfrm>
-          <a:prstGeom prst="bentConnector5">
-            <a:avLst>
-              <a:gd name="adj1" fmla="val -5987"/>
-              <a:gd name="adj2" fmla="val 570097"/>
-              <a:gd name="adj3" fmla="val 105987"/>
-            </a:avLst>
-          </a:prstGeom>
-          <a:ln w="38100">
-            <a:tailEnd type="triangle"/>
-          </a:ln>
-        </p:spPr>
-        <p:style>
-          <a:lnRef idx="2">
-            <a:schemeClr val="accent1"/>
-          </a:lnRef>
-          <a:fillRef idx="0">
-            <a:schemeClr val="accent1"/>
-          </a:fillRef>
-          <a:effectRef idx="1">
-            <a:schemeClr val="accent1"/>
-          </a:effectRef>
-          <a:fontRef idx="minor">
-            <a:schemeClr val="tx1"/>
-          </a:fontRef>
-        </p:style>
-      </p:cxnSp>
-      <mc:AlternateContent xmlns:mc="http://schemas.openxmlformats.org/markup-compatibility/2006" xmlns:a14="http://schemas.microsoft.com/office/drawing/2010/main">
-        <mc:Choice Requires="a14">
+        </p:grpSpPr>
+        <p:grpSp>
+          <p:nvGrpSpPr>
+            <p:cNvPr id="81" name="Group 80">
+              <a:extLst>
+                <a:ext uri="{FF2B5EF4-FFF2-40B4-BE49-F238E27FC236}">
+                  <a16:creationId xmlns:a16="http://schemas.microsoft.com/office/drawing/2014/main" id="{5B404942-9BCD-EF90-C83B-B477BFB9B32E}"/>
+                </a:ext>
+              </a:extLst>
+            </p:cNvPr>
+            <p:cNvGrpSpPr/>
+            <p:nvPr/>
+          </p:nvGrpSpPr>
+          <p:grpSpPr>
+            <a:xfrm>
+              <a:off x="162615" y="2252753"/>
+              <a:ext cx="5291404" cy="3818482"/>
+              <a:chOff x="162615" y="2003833"/>
+              <a:chExt cx="5291404" cy="3818482"/>
+            </a:xfrm>
+          </p:grpSpPr>
           <p:sp>
             <p:nvSpPr>
-              <p:cNvPr id="89" name="TextBox 88">
+              <p:cNvPr id="4" name="Rectangle 3">
                 <a:extLst>
                   <a:ext uri="{FF2B5EF4-FFF2-40B4-BE49-F238E27FC236}">
-                    <a16:creationId xmlns:a16="http://schemas.microsoft.com/office/drawing/2014/main" id="{F5C993C9-88D8-DF8C-B03A-47BEED71BB02}"/>
+                    <a16:creationId xmlns:a16="http://schemas.microsoft.com/office/drawing/2014/main" id="{FB01CB67-F019-D97C-59C9-B0A035DA3FD5}"/>
                   </a:ext>
                 </a:extLst>
               </p:cNvPr>
-              <p:cNvSpPr txBox="1"/>
+              <p:cNvSpPr/>
               <p:nvPr/>
             </p:nvSpPr>
             <p:spPr>
               <a:xfrm>
-                <a:off x="3400959" y="6270589"/>
-                <a:ext cx="2359171" cy="369332"/>
+                <a:off x="3227240" y="2003833"/>
+                <a:ext cx="1232213" cy="902191"/>
               </a:xfrm>
               <a:prstGeom prst="rect">
                 <a:avLst/>
               </a:prstGeom>
-              <a:noFill/>
             </p:spPr>
+            <p:style>
+              <a:lnRef idx="2">
+                <a:schemeClr val="accent1">
+                  <a:shade val="15000"/>
+                </a:schemeClr>
+              </a:lnRef>
+              <a:fillRef idx="1">
+                <a:schemeClr val="accent1"/>
+              </a:fillRef>
+              <a:effectRef idx="0">
+                <a:schemeClr val="accent1"/>
+              </a:effectRef>
+              <a:fontRef idx="minor">
+                <a:schemeClr val="lt1"/>
+              </a:fontRef>
+            </p:style>
             <p:txBody>
-              <a:bodyPr wrap="none" rtlCol="0">
-                <a:spAutoFit/>
-              </a:bodyPr>
+              <a:bodyPr rtlCol="0" anchor="ctr"/>
               <a:lstStyle/>
               <a:p>
-                <a:pPr/>
-                <a14:m>
-                  <m:oMathPara xmlns:m="http://schemas.openxmlformats.org/officeDocument/2006/math">
-                    <m:oMathParaPr>
-                      <m:jc m:val="centerGroup"/>
-                    </m:oMathParaPr>
-                    <m:oMath xmlns:m="http://schemas.openxmlformats.org/officeDocument/2006/math">
-                      <m:r>
-                        <a:rPr lang="nb-NO" b="0" i="1" smtClean="0">
-                          <a:latin typeface="Cambria Math" panose="02040503050406030204" pitchFamily="18" charset="0"/>
-                        </a:rPr>
-                        <m:t>𝑀𝑒𝑎𝑠𝑢𝑟𝑒𝑑</m:t>
-                      </m:r>
-                      <m:r>
-                        <a:rPr lang="nb-NO" b="0" i="1" smtClean="0">
-                          <a:latin typeface="Cambria Math" panose="02040503050406030204" pitchFamily="18" charset="0"/>
-                        </a:rPr>
-                        <m:t> </m:t>
-                      </m:r>
-                      <m:r>
-                        <a:rPr lang="nb-NO" b="0" i="1" smtClean="0">
-                          <a:latin typeface="Cambria Math" panose="02040503050406030204" pitchFamily="18" charset="0"/>
-                        </a:rPr>
-                        <m:t>𝑝𝑟𝑒𝑠𝑠𝑢𝑟𝑒𝑠</m:t>
-                      </m:r>
-                    </m:oMath>
-                  </m:oMathPara>
-                </a14:m>
+                <a:pPr algn="ctr"/>
+                <a:r>
+                  <a:rPr lang="nb-NO" dirty="0"/>
+                  <a:t>Feed Forward</a:t>
+                </a:r>
                 <a:endParaRPr lang="en-GB" dirty="0"/>
               </a:p>
             </p:txBody>
           </p:sp>
-        </mc:Choice>
-        <mc:Fallback xmlns="">
           <p:sp>
             <p:nvSpPr>
-              <p:cNvPr id="89" name="TextBox 88">
+              <p:cNvPr id="5" name="Rectangle 4">
                 <a:extLst>
                   <a:ext uri="{FF2B5EF4-FFF2-40B4-BE49-F238E27FC236}">
-                    <a16:creationId xmlns:a16="http://schemas.microsoft.com/office/drawing/2014/main" id="{F5C993C9-88D8-DF8C-B03A-47BEED71BB02}"/>
+                    <a16:creationId xmlns:a16="http://schemas.microsoft.com/office/drawing/2014/main" id="{CD071B50-F41A-EE9D-CDEC-C1EC8ABA3403}"/>
                   </a:ext>
                 </a:extLst>
               </p:cNvPr>
-              <p:cNvSpPr txBox="1">
-                <a:spLocks noRot="1" noChangeAspect="1" noMove="1" noResize="1" noEditPoints="1" noAdjustHandles="1" noChangeArrowheads="1" noChangeShapeType="1" noTextEdit="1"/>
-              </p:cNvSpPr>
+              <p:cNvSpPr/>
               <p:nvPr/>
             </p:nvSpPr>
             <p:spPr>
               <a:xfrm>
-                <a:off x="3400959" y="6270589"/>
-                <a:ext cx="2359171" cy="369332"/>
+                <a:off x="2960541" y="4920124"/>
+                <a:ext cx="950210" cy="902191"/>
               </a:xfrm>
               <a:prstGeom prst="rect">
                 <a:avLst/>
               </a:prstGeom>
-              <a:blipFill>
-                <a:blip r:embed="rId13"/>
-                <a:stretch>
-                  <a:fillRect b="-6667"/>
-                </a:stretch>
-              </a:blipFill>
             </p:spPr>
+            <p:style>
+              <a:lnRef idx="2">
+                <a:schemeClr val="accent1">
+                  <a:shade val="15000"/>
+                </a:schemeClr>
+              </a:lnRef>
+              <a:fillRef idx="1">
+                <a:schemeClr val="accent1"/>
+              </a:fillRef>
+              <a:effectRef idx="0">
+                <a:schemeClr val="accent1"/>
+              </a:effectRef>
+              <a:fontRef idx="minor">
+                <a:schemeClr val="lt1"/>
+              </a:fontRef>
+            </p:style>
             <p:txBody>
-              <a:bodyPr/>
+              <a:bodyPr rtlCol="0" anchor="ctr"/>
               <a:lstStyle/>
               <a:p>
+                <a:pPr algn="ctr"/>
                 <a:r>
-                  <a:rPr lang="en-GB">
-                    <a:noFill/>
-                  </a:rPr>
-                  <a:t> </a:t>
+                  <a:rPr lang="nb-NO" dirty="0"/>
+                  <a:t>System</a:t>
                 </a:r>
+                <a:endParaRPr lang="en-GB" dirty="0"/>
               </a:p>
             </p:txBody>
           </p:sp>
-        </mc:Fallback>
-      </mc:AlternateContent>
+          <p:sp>
+            <p:nvSpPr>
+              <p:cNvPr id="6" name="Rectangle 5">
+                <a:extLst>
+                  <a:ext uri="{FF2B5EF4-FFF2-40B4-BE49-F238E27FC236}">
+                    <a16:creationId xmlns:a16="http://schemas.microsoft.com/office/drawing/2014/main" id="{16C6BF87-5F9E-6A7F-A24D-7A22FC051C85}"/>
+                  </a:ext>
+                </a:extLst>
+              </p:cNvPr>
+              <p:cNvSpPr/>
+              <p:nvPr/>
+            </p:nvSpPr>
+            <p:spPr>
+              <a:xfrm>
+                <a:off x="4547671" y="4920124"/>
+                <a:ext cx="893478" cy="902191"/>
+              </a:xfrm>
+              <a:prstGeom prst="rect">
+                <a:avLst/>
+              </a:prstGeom>
+            </p:spPr>
+            <p:style>
+              <a:lnRef idx="2">
+                <a:schemeClr val="accent1">
+                  <a:shade val="15000"/>
+                </a:schemeClr>
+              </a:lnRef>
+              <a:fillRef idx="1">
+                <a:schemeClr val="accent1"/>
+              </a:fillRef>
+              <a:effectRef idx="0">
+                <a:schemeClr val="accent1"/>
+              </a:effectRef>
+              <a:fontRef idx="minor">
+                <a:schemeClr val="lt1"/>
+              </a:fontRef>
+            </p:style>
+            <p:txBody>
+              <a:bodyPr rtlCol="0" anchor="ctr"/>
+              <a:lstStyle/>
+              <a:p>
+                <a:pPr algn="ctr"/>
+                <a:r>
+                  <a:rPr lang="nb-NO" dirty="0"/>
+                  <a:t>DCV</a:t>
+                </a:r>
+                <a:endParaRPr lang="en-GB" dirty="0"/>
+              </a:p>
+            </p:txBody>
+          </p:sp>
+          <p:sp>
+            <p:nvSpPr>
+              <p:cNvPr id="7" name="Rectangle 6">
+                <a:extLst>
+                  <a:ext uri="{FF2B5EF4-FFF2-40B4-BE49-F238E27FC236}">
+                    <a16:creationId xmlns:a16="http://schemas.microsoft.com/office/drawing/2014/main" id="{DBB1C8AA-AFAC-9D4B-7E36-CC83AE7B5360}"/>
+                  </a:ext>
+                </a:extLst>
+              </p:cNvPr>
+              <p:cNvSpPr/>
+              <p:nvPr/>
+            </p:nvSpPr>
+            <p:spPr>
+              <a:xfrm>
+                <a:off x="3604090" y="3386535"/>
+                <a:ext cx="849992" cy="902191"/>
+              </a:xfrm>
+              <a:prstGeom prst="rect">
+                <a:avLst/>
+              </a:prstGeom>
+            </p:spPr>
+            <p:style>
+              <a:lnRef idx="2">
+                <a:schemeClr val="accent1">
+                  <a:shade val="15000"/>
+                </a:schemeClr>
+              </a:lnRef>
+              <a:fillRef idx="1">
+                <a:schemeClr val="accent1"/>
+              </a:fillRef>
+              <a:effectRef idx="0">
+                <a:schemeClr val="accent1"/>
+              </a:effectRef>
+              <a:fontRef idx="minor">
+                <a:schemeClr val="lt1"/>
+              </a:fontRef>
+            </p:style>
+            <p:txBody>
+              <a:bodyPr rtlCol="0" anchor="ctr"/>
+              <a:lstStyle/>
+              <a:p>
+                <a:pPr algn="ctr"/>
+                <a:r>
+                  <a:rPr lang="nb-NO" dirty="0"/>
+                  <a:t>PID</a:t>
+                </a:r>
+                <a:endParaRPr lang="en-GB" dirty="0"/>
+              </a:p>
+            </p:txBody>
+          </p:sp>
+          <p:sp>
+            <p:nvSpPr>
+              <p:cNvPr id="8" name="Oval 7">
+                <a:extLst>
+                  <a:ext uri="{FF2B5EF4-FFF2-40B4-BE49-F238E27FC236}">
+                    <a16:creationId xmlns:a16="http://schemas.microsoft.com/office/drawing/2014/main" id="{AB9C7E47-CAC0-4AC5-34CE-C32825CAB0C2}"/>
+                  </a:ext>
+                </a:extLst>
+              </p:cNvPr>
+              <p:cNvSpPr/>
+              <p:nvPr/>
+            </p:nvSpPr>
+            <p:spPr>
+              <a:xfrm>
+                <a:off x="4814410" y="3657630"/>
+                <a:ext cx="360000" cy="360000"/>
+              </a:xfrm>
+              <a:prstGeom prst="ellipse">
+                <a:avLst/>
+              </a:prstGeom>
+            </p:spPr>
+            <p:style>
+              <a:lnRef idx="2">
+                <a:schemeClr val="accent1">
+                  <a:shade val="15000"/>
+                </a:schemeClr>
+              </a:lnRef>
+              <a:fillRef idx="1">
+                <a:schemeClr val="accent1"/>
+              </a:fillRef>
+              <a:effectRef idx="0">
+                <a:schemeClr val="accent1"/>
+              </a:effectRef>
+              <a:fontRef idx="minor">
+                <a:schemeClr val="lt1"/>
+              </a:fontRef>
+            </p:style>
+            <p:txBody>
+              <a:bodyPr rtlCol="0" anchor="ctr"/>
+              <a:lstStyle/>
+              <a:p>
+                <a:pPr algn="ctr"/>
+                <a:endParaRPr lang="en-GB"/>
+              </a:p>
+            </p:txBody>
+          </p:sp>
+          <p:sp>
+            <p:nvSpPr>
+              <p:cNvPr id="9" name="Oval 8">
+                <a:extLst>
+                  <a:ext uri="{FF2B5EF4-FFF2-40B4-BE49-F238E27FC236}">
+                    <a16:creationId xmlns:a16="http://schemas.microsoft.com/office/drawing/2014/main" id="{D735C08D-3E8D-089F-543E-07D99E6E21DC}"/>
+                  </a:ext>
+                </a:extLst>
+              </p:cNvPr>
+              <p:cNvSpPr/>
+              <p:nvPr/>
+            </p:nvSpPr>
+            <p:spPr>
+              <a:xfrm>
+                <a:off x="2342803" y="3657630"/>
+                <a:ext cx="360000" cy="360000"/>
+              </a:xfrm>
+              <a:prstGeom prst="ellipse">
+                <a:avLst/>
+              </a:prstGeom>
+            </p:spPr>
+            <p:style>
+              <a:lnRef idx="2">
+                <a:schemeClr val="accent1">
+                  <a:shade val="15000"/>
+                </a:schemeClr>
+              </a:lnRef>
+              <a:fillRef idx="1">
+                <a:schemeClr val="accent1"/>
+              </a:fillRef>
+              <a:effectRef idx="0">
+                <a:schemeClr val="accent1"/>
+              </a:effectRef>
+              <a:fontRef idx="minor">
+                <a:schemeClr val="lt1"/>
+              </a:fontRef>
+            </p:style>
+            <p:txBody>
+              <a:bodyPr rtlCol="0" anchor="ctr"/>
+              <a:lstStyle/>
+              <a:p>
+                <a:pPr algn="ctr"/>
+                <a:endParaRPr lang="en-GB"/>
+              </a:p>
+            </p:txBody>
+          </p:sp>
+          <p:cxnSp>
+            <p:nvCxnSpPr>
+              <p:cNvPr id="10" name="Straight Connector 9">
+                <a:extLst>
+                  <a:ext uri="{FF2B5EF4-FFF2-40B4-BE49-F238E27FC236}">
+                    <a16:creationId xmlns:a16="http://schemas.microsoft.com/office/drawing/2014/main" id="{F61ED42D-20E2-2645-0363-28E8F74E0675}"/>
+                  </a:ext>
+                </a:extLst>
+              </p:cNvPr>
+              <p:cNvCxnSpPr/>
+              <p:nvPr/>
+            </p:nvCxnSpPr>
+            <p:spPr>
+              <a:xfrm>
+                <a:off x="4703695" y="3590459"/>
+                <a:ext cx="180000" cy="0"/>
+              </a:xfrm>
+              <a:prstGeom prst="line">
+                <a:avLst/>
+              </a:prstGeom>
+              <a:ln w="38100">
+                <a:solidFill>
+                  <a:schemeClr val="tx1"/>
+                </a:solidFill>
+              </a:ln>
+            </p:spPr>
+            <p:style>
+              <a:lnRef idx="2">
+                <a:schemeClr val="accent1"/>
+              </a:lnRef>
+              <a:fillRef idx="0">
+                <a:schemeClr val="accent1"/>
+              </a:fillRef>
+              <a:effectRef idx="1">
+                <a:schemeClr val="accent1"/>
+              </a:effectRef>
+              <a:fontRef idx="minor">
+                <a:schemeClr val="tx1"/>
+              </a:fontRef>
+            </p:style>
+          </p:cxnSp>
+          <p:cxnSp>
+            <p:nvCxnSpPr>
+              <p:cNvPr id="11" name="Straight Connector 10">
+                <a:extLst>
+                  <a:ext uri="{FF2B5EF4-FFF2-40B4-BE49-F238E27FC236}">
+                    <a16:creationId xmlns:a16="http://schemas.microsoft.com/office/drawing/2014/main" id="{E46CE380-FE0A-C93F-87A2-7659D06754F6}"/>
+                  </a:ext>
+                </a:extLst>
+              </p:cNvPr>
+              <p:cNvCxnSpPr>
+                <a:cxnSpLocks/>
+              </p:cNvCxnSpPr>
+              <p:nvPr/>
+            </p:nvCxnSpPr>
+            <p:spPr>
+              <a:xfrm rot="16200000">
+                <a:off x="4704653" y="3593943"/>
+                <a:ext cx="180000" cy="0"/>
+              </a:xfrm>
+              <a:prstGeom prst="line">
+                <a:avLst/>
+              </a:prstGeom>
+              <a:ln w="38100">
+                <a:solidFill>
+                  <a:schemeClr val="tx1"/>
+                </a:solidFill>
+              </a:ln>
+            </p:spPr>
+            <p:style>
+              <a:lnRef idx="2">
+                <a:schemeClr val="accent1"/>
+              </a:lnRef>
+              <a:fillRef idx="0">
+                <a:schemeClr val="accent1"/>
+              </a:fillRef>
+              <a:effectRef idx="1">
+                <a:schemeClr val="accent1"/>
+              </a:effectRef>
+              <a:fontRef idx="minor">
+                <a:schemeClr val="tx1"/>
+              </a:fontRef>
+            </p:style>
+          </p:cxnSp>
+          <p:cxnSp>
+            <p:nvCxnSpPr>
+              <p:cNvPr id="12" name="Straight Connector 11">
+                <a:extLst>
+                  <a:ext uri="{FF2B5EF4-FFF2-40B4-BE49-F238E27FC236}">
+                    <a16:creationId xmlns:a16="http://schemas.microsoft.com/office/drawing/2014/main" id="{5F718451-1138-9200-2E9B-64291E7120D6}"/>
+                  </a:ext>
+                </a:extLst>
+              </p:cNvPr>
+              <p:cNvCxnSpPr/>
+              <p:nvPr/>
+            </p:nvCxnSpPr>
+            <p:spPr>
+              <a:xfrm>
+                <a:off x="4697509" y="4044704"/>
+                <a:ext cx="180000" cy="0"/>
+              </a:xfrm>
+              <a:prstGeom prst="line">
+                <a:avLst/>
+              </a:prstGeom>
+              <a:ln w="38100">
+                <a:solidFill>
+                  <a:schemeClr val="tx1"/>
+                </a:solidFill>
+              </a:ln>
+            </p:spPr>
+            <p:style>
+              <a:lnRef idx="2">
+                <a:schemeClr val="accent1"/>
+              </a:lnRef>
+              <a:fillRef idx="0">
+                <a:schemeClr val="accent1"/>
+              </a:fillRef>
+              <a:effectRef idx="1">
+                <a:schemeClr val="accent1"/>
+              </a:effectRef>
+              <a:fontRef idx="minor">
+                <a:schemeClr val="tx1"/>
+              </a:fontRef>
+            </p:style>
+          </p:cxnSp>
+          <p:cxnSp>
+            <p:nvCxnSpPr>
+              <p:cNvPr id="13" name="Straight Connector 12">
+                <a:extLst>
+                  <a:ext uri="{FF2B5EF4-FFF2-40B4-BE49-F238E27FC236}">
+                    <a16:creationId xmlns:a16="http://schemas.microsoft.com/office/drawing/2014/main" id="{8DD9BEB5-1AAC-6C15-3DAD-958191D553D2}"/>
+                  </a:ext>
+                </a:extLst>
+              </p:cNvPr>
+              <p:cNvCxnSpPr>
+                <a:cxnSpLocks/>
+              </p:cNvCxnSpPr>
+              <p:nvPr/>
+            </p:nvCxnSpPr>
+            <p:spPr>
+              <a:xfrm rot="16200000">
+                <a:off x="4696465" y="4044704"/>
+                <a:ext cx="180000" cy="0"/>
+              </a:xfrm>
+              <a:prstGeom prst="line">
+                <a:avLst/>
+              </a:prstGeom>
+              <a:ln w="38100">
+                <a:solidFill>
+                  <a:schemeClr val="tx1"/>
+                </a:solidFill>
+              </a:ln>
+            </p:spPr>
+            <p:style>
+              <a:lnRef idx="2">
+                <a:schemeClr val="accent1"/>
+              </a:lnRef>
+              <a:fillRef idx="0">
+                <a:schemeClr val="accent1"/>
+              </a:fillRef>
+              <a:effectRef idx="1">
+                <a:schemeClr val="accent1"/>
+              </a:effectRef>
+              <a:fontRef idx="minor">
+                <a:schemeClr val="tx1"/>
+              </a:fontRef>
+            </p:style>
+          </p:cxnSp>
+          <p:cxnSp>
+            <p:nvCxnSpPr>
+              <p:cNvPr id="14" name="Straight Arrow Connector 13">
+                <a:extLst>
+                  <a:ext uri="{FF2B5EF4-FFF2-40B4-BE49-F238E27FC236}">
+                    <a16:creationId xmlns:a16="http://schemas.microsoft.com/office/drawing/2014/main" id="{BF51B4B7-7899-224E-39DC-F8D3BBC5E248}"/>
+                  </a:ext>
+                </a:extLst>
+              </p:cNvPr>
+              <p:cNvCxnSpPr>
+                <a:cxnSpLocks/>
+                <a:stCxn id="7" idx="3"/>
+                <a:endCxn id="8" idx="2"/>
+              </p:cNvCxnSpPr>
+              <p:nvPr/>
+            </p:nvCxnSpPr>
+            <p:spPr>
+              <a:xfrm flipV="1">
+                <a:off x="4454082" y="3837630"/>
+                <a:ext cx="360328" cy="1"/>
+              </a:xfrm>
+              <a:prstGeom prst="straightConnector1">
+                <a:avLst/>
+              </a:prstGeom>
+              <a:ln w="38100">
+                <a:tailEnd type="triangle"/>
+              </a:ln>
+            </p:spPr>
+            <p:style>
+              <a:lnRef idx="2">
+                <a:schemeClr val="accent1"/>
+              </a:lnRef>
+              <a:fillRef idx="0">
+                <a:schemeClr val="accent1"/>
+              </a:fillRef>
+              <a:effectRef idx="1">
+                <a:schemeClr val="accent1"/>
+              </a:effectRef>
+              <a:fontRef idx="minor">
+                <a:schemeClr val="tx1"/>
+              </a:fontRef>
+            </p:style>
+          </p:cxnSp>
+          <p:cxnSp>
+            <p:nvCxnSpPr>
+              <p:cNvPr id="15" name="Straight Arrow Connector 14">
+                <a:extLst>
+                  <a:ext uri="{FF2B5EF4-FFF2-40B4-BE49-F238E27FC236}">
+                    <a16:creationId xmlns:a16="http://schemas.microsoft.com/office/drawing/2014/main" id="{7C456985-7972-4A55-A0C9-E3C7B507E7D2}"/>
+                  </a:ext>
+                </a:extLst>
+              </p:cNvPr>
+              <p:cNvCxnSpPr>
+                <a:cxnSpLocks/>
+                <a:stCxn id="8" idx="4"/>
+                <a:endCxn id="6" idx="0"/>
+              </p:cNvCxnSpPr>
+              <p:nvPr/>
+            </p:nvCxnSpPr>
+            <p:spPr>
+              <a:xfrm>
+                <a:off x="4994410" y="4017630"/>
+                <a:ext cx="0" cy="902494"/>
+              </a:xfrm>
+              <a:prstGeom prst="straightConnector1">
+                <a:avLst/>
+              </a:prstGeom>
+              <a:ln w="38100">
+                <a:tailEnd type="triangle"/>
+              </a:ln>
+            </p:spPr>
+            <p:style>
+              <a:lnRef idx="2">
+                <a:schemeClr val="accent1"/>
+              </a:lnRef>
+              <a:fillRef idx="0">
+                <a:schemeClr val="accent1"/>
+              </a:fillRef>
+              <a:effectRef idx="1">
+                <a:schemeClr val="accent1"/>
+              </a:effectRef>
+              <a:fontRef idx="minor">
+                <a:schemeClr val="tx1"/>
+              </a:fontRef>
+            </p:style>
+          </p:cxnSp>
+          <p:cxnSp>
+            <p:nvCxnSpPr>
+              <p:cNvPr id="16" name="Straight Arrow Connector 15">
+                <a:extLst>
+                  <a:ext uri="{FF2B5EF4-FFF2-40B4-BE49-F238E27FC236}">
+                    <a16:creationId xmlns:a16="http://schemas.microsoft.com/office/drawing/2014/main" id="{B3E37948-BAC5-BC12-C11E-16C6948B5A1B}"/>
+                  </a:ext>
+                </a:extLst>
+              </p:cNvPr>
+              <p:cNvCxnSpPr>
+                <a:cxnSpLocks/>
+                <a:stCxn id="9" idx="6"/>
+                <a:endCxn id="7" idx="1"/>
+              </p:cNvCxnSpPr>
+              <p:nvPr/>
+            </p:nvCxnSpPr>
+            <p:spPr>
+              <a:xfrm>
+                <a:off x="2702803" y="3837630"/>
+                <a:ext cx="901287" cy="1"/>
+              </a:xfrm>
+              <a:prstGeom prst="straightConnector1">
+                <a:avLst/>
+              </a:prstGeom>
+              <a:ln w="38100">
+                <a:tailEnd type="triangle"/>
+              </a:ln>
+            </p:spPr>
+            <p:style>
+              <a:lnRef idx="2">
+                <a:schemeClr val="accent1"/>
+              </a:lnRef>
+              <a:fillRef idx="0">
+                <a:schemeClr val="accent1"/>
+              </a:fillRef>
+              <a:effectRef idx="1">
+                <a:schemeClr val="accent1"/>
+              </a:effectRef>
+              <a:fontRef idx="minor">
+                <a:schemeClr val="tx1"/>
+              </a:fontRef>
+            </p:style>
+          </p:cxnSp>
+          <p:cxnSp>
+            <p:nvCxnSpPr>
+              <p:cNvPr id="17" name="Straight Arrow Connector 16">
+                <a:extLst>
+                  <a:ext uri="{FF2B5EF4-FFF2-40B4-BE49-F238E27FC236}">
+                    <a16:creationId xmlns:a16="http://schemas.microsoft.com/office/drawing/2014/main" id="{0DC6CFB9-29C3-E3FB-CD43-D78F072885A6}"/>
+                  </a:ext>
+                </a:extLst>
+              </p:cNvPr>
+              <p:cNvCxnSpPr>
+                <a:cxnSpLocks/>
+                <a:stCxn id="6" idx="1"/>
+                <a:endCxn id="5" idx="3"/>
+              </p:cNvCxnSpPr>
+              <p:nvPr/>
+            </p:nvCxnSpPr>
+            <p:spPr>
+              <a:xfrm flipH="1">
+                <a:off x="3910751" y="5371220"/>
+                <a:ext cx="636920" cy="0"/>
+              </a:xfrm>
+              <a:prstGeom prst="straightConnector1">
+                <a:avLst/>
+              </a:prstGeom>
+              <a:ln w="38100">
+                <a:tailEnd type="triangle"/>
+              </a:ln>
+            </p:spPr>
+            <p:style>
+              <a:lnRef idx="2">
+                <a:schemeClr val="accent1"/>
+              </a:lnRef>
+              <a:fillRef idx="0">
+                <a:schemeClr val="accent1"/>
+              </a:fillRef>
+              <a:effectRef idx="1">
+                <a:schemeClr val="accent1"/>
+              </a:effectRef>
+              <a:fontRef idx="minor">
+                <a:schemeClr val="tx1"/>
+              </a:fontRef>
+            </p:style>
+          </p:cxnSp>
+          <p:cxnSp>
+            <p:nvCxnSpPr>
+              <p:cNvPr id="18" name="Connector: Elbow 17">
+                <a:extLst>
+                  <a:ext uri="{FF2B5EF4-FFF2-40B4-BE49-F238E27FC236}">
+                    <a16:creationId xmlns:a16="http://schemas.microsoft.com/office/drawing/2014/main" id="{750D5B81-8DC6-E3EA-B33A-C10905CABE01}"/>
+                  </a:ext>
+                </a:extLst>
+              </p:cNvPr>
+              <p:cNvCxnSpPr>
+                <a:cxnSpLocks/>
+                <a:stCxn id="4" idx="3"/>
+                <a:endCxn id="8" idx="0"/>
+              </p:cNvCxnSpPr>
+              <p:nvPr/>
+            </p:nvCxnSpPr>
+            <p:spPr>
+              <a:xfrm>
+                <a:off x="4459453" y="2454929"/>
+                <a:ext cx="534957" cy="1202701"/>
+              </a:xfrm>
+              <a:prstGeom prst="bentConnector2">
+                <a:avLst/>
+              </a:prstGeom>
+              <a:ln w="38100">
+                <a:tailEnd type="triangle"/>
+              </a:ln>
+            </p:spPr>
+            <p:style>
+              <a:lnRef idx="2">
+                <a:schemeClr val="accent1"/>
+              </a:lnRef>
+              <a:fillRef idx="0">
+                <a:schemeClr val="accent1"/>
+              </a:fillRef>
+              <a:effectRef idx="1">
+                <a:schemeClr val="accent1"/>
+              </a:effectRef>
+              <a:fontRef idx="minor">
+                <a:schemeClr val="tx1"/>
+              </a:fontRef>
+            </p:style>
+          </p:cxnSp>
+          <p:sp>
+            <p:nvSpPr>
+              <p:cNvPr id="19" name="Rectangle 18">
+                <a:extLst>
+                  <a:ext uri="{FF2B5EF4-FFF2-40B4-BE49-F238E27FC236}">
+                    <a16:creationId xmlns:a16="http://schemas.microsoft.com/office/drawing/2014/main" id="{54820EA8-1EF1-F34F-46D0-D2FBF5388085}"/>
+                  </a:ext>
+                </a:extLst>
+              </p:cNvPr>
+              <p:cNvSpPr/>
+              <p:nvPr/>
+            </p:nvSpPr>
+            <p:spPr>
+              <a:xfrm>
+                <a:off x="162615" y="2003833"/>
+                <a:ext cx="1232214" cy="2284894"/>
+              </a:xfrm>
+              <a:prstGeom prst="rect">
+                <a:avLst/>
+              </a:prstGeom>
+            </p:spPr>
+            <p:style>
+              <a:lnRef idx="2">
+                <a:schemeClr val="accent1">
+                  <a:shade val="15000"/>
+                </a:schemeClr>
+              </a:lnRef>
+              <a:fillRef idx="1">
+                <a:schemeClr val="accent1"/>
+              </a:fillRef>
+              <a:effectRef idx="0">
+                <a:schemeClr val="accent1"/>
+              </a:effectRef>
+              <a:fontRef idx="minor">
+                <a:schemeClr val="lt1"/>
+              </a:fontRef>
+            </p:style>
+            <p:txBody>
+              <a:bodyPr rtlCol="0" anchor="ctr"/>
+              <a:lstStyle/>
+              <a:p>
+                <a:pPr algn="ctr"/>
+                <a:r>
+                  <a:rPr lang="nb-NO" dirty="0"/>
+                  <a:t>Referance</a:t>
+                </a:r>
+                <a:endParaRPr lang="en-GB" dirty="0"/>
+              </a:p>
+            </p:txBody>
+          </p:sp>
+          <p:cxnSp>
+            <p:nvCxnSpPr>
+              <p:cNvPr id="20" name="Straight Arrow Connector 19">
+                <a:extLst>
+                  <a:ext uri="{FF2B5EF4-FFF2-40B4-BE49-F238E27FC236}">
+                    <a16:creationId xmlns:a16="http://schemas.microsoft.com/office/drawing/2014/main" id="{F7035C13-78F3-2595-18B3-6AA1E517A310}"/>
+                  </a:ext>
+                </a:extLst>
+              </p:cNvPr>
+              <p:cNvCxnSpPr>
+                <a:cxnSpLocks/>
+                <a:endCxn id="9" idx="2"/>
+              </p:cNvCxnSpPr>
+              <p:nvPr/>
+            </p:nvCxnSpPr>
+            <p:spPr>
+              <a:xfrm>
+                <a:off x="1414585" y="3828851"/>
+                <a:ext cx="928218" cy="8779"/>
+              </a:xfrm>
+              <a:prstGeom prst="straightConnector1">
+                <a:avLst/>
+              </a:prstGeom>
+              <a:ln w="38100">
+                <a:tailEnd type="triangle"/>
+              </a:ln>
+            </p:spPr>
+            <p:style>
+              <a:lnRef idx="2">
+                <a:schemeClr val="accent1"/>
+              </a:lnRef>
+              <a:fillRef idx="0">
+                <a:schemeClr val="accent1"/>
+              </a:fillRef>
+              <a:effectRef idx="1">
+                <a:schemeClr val="accent1"/>
+              </a:effectRef>
+              <a:fontRef idx="minor">
+                <a:schemeClr val="tx1"/>
+              </a:fontRef>
+            </p:style>
+          </p:cxnSp>
+          <p:cxnSp>
+            <p:nvCxnSpPr>
+              <p:cNvPr id="21" name="Straight Arrow Connector 20">
+                <a:extLst>
+                  <a:ext uri="{FF2B5EF4-FFF2-40B4-BE49-F238E27FC236}">
+                    <a16:creationId xmlns:a16="http://schemas.microsoft.com/office/drawing/2014/main" id="{9A81141A-640E-2FFC-CAF1-C9FE4B4C6F4D}"/>
+                  </a:ext>
+                </a:extLst>
+              </p:cNvPr>
+              <p:cNvCxnSpPr>
+                <a:cxnSpLocks/>
+                <a:endCxn id="4" idx="1"/>
+              </p:cNvCxnSpPr>
+              <p:nvPr/>
+            </p:nvCxnSpPr>
+            <p:spPr>
+              <a:xfrm>
+                <a:off x="1150059" y="2454929"/>
+                <a:ext cx="2077181" cy="0"/>
+              </a:xfrm>
+              <a:prstGeom prst="straightConnector1">
+                <a:avLst/>
+              </a:prstGeom>
+              <a:ln w="38100">
+                <a:tailEnd type="triangle"/>
+              </a:ln>
+            </p:spPr>
+            <p:style>
+              <a:lnRef idx="2">
+                <a:schemeClr val="accent1"/>
+              </a:lnRef>
+              <a:fillRef idx="0">
+                <a:schemeClr val="accent1"/>
+              </a:fillRef>
+              <a:effectRef idx="1">
+                <a:schemeClr val="accent1"/>
+              </a:effectRef>
+              <a:fontRef idx="minor">
+                <a:schemeClr val="tx1"/>
+              </a:fontRef>
+            </p:style>
+          </p:cxnSp>
+          <p:cxnSp>
+            <p:nvCxnSpPr>
+              <p:cNvPr id="22" name="Connector: Elbow 21">
+                <a:extLst>
+                  <a:ext uri="{FF2B5EF4-FFF2-40B4-BE49-F238E27FC236}">
+                    <a16:creationId xmlns:a16="http://schemas.microsoft.com/office/drawing/2014/main" id="{12382DFE-24DE-686B-D81E-C3DAE9093C0C}"/>
+                  </a:ext>
+                </a:extLst>
+              </p:cNvPr>
+              <p:cNvCxnSpPr>
+                <a:cxnSpLocks/>
+                <a:stCxn id="5" idx="1"/>
+                <a:endCxn id="9" idx="4"/>
+              </p:cNvCxnSpPr>
+              <p:nvPr/>
+            </p:nvCxnSpPr>
+            <p:spPr>
+              <a:xfrm rot="10800000">
+                <a:off x="2522803" y="4017630"/>
+                <a:ext cx="437738" cy="1353590"/>
+              </a:xfrm>
+              <a:prstGeom prst="bentConnector2">
+                <a:avLst/>
+              </a:prstGeom>
+              <a:ln w="38100">
+                <a:tailEnd type="triangle"/>
+              </a:ln>
+            </p:spPr>
+            <p:style>
+              <a:lnRef idx="2">
+                <a:schemeClr val="accent1"/>
+              </a:lnRef>
+              <a:fillRef idx="0">
+                <a:schemeClr val="accent1"/>
+              </a:fillRef>
+              <a:effectRef idx="1">
+                <a:schemeClr val="accent1"/>
+              </a:effectRef>
+              <a:fontRef idx="minor">
+                <a:schemeClr val="tx1"/>
+              </a:fontRef>
+            </p:style>
+          </p:cxnSp>
+          <p:cxnSp>
+            <p:nvCxnSpPr>
+              <p:cNvPr id="24" name="Straight Connector 23">
+                <a:extLst>
+                  <a:ext uri="{FF2B5EF4-FFF2-40B4-BE49-F238E27FC236}">
+                    <a16:creationId xmlns:a16="http://schemas.microsoft.com/office/drawing/2014/main" id="{DA209A58-C37E-7109-ADB2-E8F69F9D2AFA}"/>
+                  </a:ext>
+                </a:extLst>
+              </p:cNvPr>
+              <p:cNvCxnSpPr/>
+              <p:nvPr/>
+            </p:nvCxnSpPr>
+            <p:spPr>
+              <a:xfrm>
+                <a:off x="2175940" y="3657630"/>
+                <a:ext cx="180000" cy="0"/>
+              </a:xfrm>
+              <a:prstGeom prst="line">
+                <a:avLst/>
+              </a:prstGeom>
+              <a:ln w="38100">
+                <a:solidFill>
+                  <a:schemeClr val="tx1"/>
+                </a:solidFill>
+              </a:ln>
+            </p:spPr>
+            <p:style>
+              <a:lnRef idx="2">
+                <a:schemeClr val="accent1"/>
+              </a:lnRef>
+              <a:fillRef idx="0">
+                <a:schemeClr val="accent1"/>
+              </a:fillRef>
+              <a:effectRef idx="1">
+                <a:schemeClr val="accent1"/>
+              </a:effectRef>
+              <a:fontRef idx="minor">
+                <a:schemeClr val="tx1"/>
+              </a:fontRef>
+            </p:style>
+          </p:cxnSp>
+          <p:cxnSp>
+            <p:nvCxnSpPr>
+              <p:cNvPr id="25" name="Straight Connector 24">
+                <a:extLst>
+                  <a:ext uri="{FF2B5EF4-FFF2-40B4-BE49-F238E27FC236}">
+                    <a16:creationId xmlns:a16="http://schemas.microsoft.com/office/drawing/2014/main" id="{A7471B7C-BB1B-9DD8-B137-84F4C129D76C}"/>
+                  </a:ext>
+                </a:extLst>
+              </p:cNvPr>
+              <p:cNvCxnSpPr>
+                <a:cxnSpLocks/>
+              </p:cNvCxnSpPr>
+              <p:nvPr/>
+            </p:nvCxnSpPr>
+            <p:spPr>
+              <a:xfrm rot="16200000">
+                <a:off x="2174896" y="3657630"/>
+                <a:ext cx="180000" cy="0"/>
+              </a:xfrm>
+              <a:prstGeom prst="line">
+                <a:avLst/>
+              </a:prstGeom>
+              <a:ln w="38100">
+                <a:solidFill>
+                  <a:schemeClr val="tx1"/>
+                </a:solidFill>
+              </a:ln>
+            </p:spPr>
+            <p:style>
+              <a:lnRef idx="2">
+                <a:schemeClr val="accent1"/>
+              </a:lnRef>
+              <a:fillRef idx="0">
+                <a:schemeClr val="accent1"/>
+              </a:fillRef>
+              <a:effectRef idx="1">
+                <a:schemeClr val="accent1"/>
+              </a:effectRef>
+              <a:fontRef idx="minor">
+                <a:schemeClr val="tx1"/>
+              </a:fontRef>
+            </p:style>
+          </p:cxnSp>
+          <p:cxnSp>
+            <p:nvCxnSpPr>
+              <p:cNvPr id="26" name="Straight Connector 25">
+                <a:extLst>
+                  <a:ext uri="{FF2B5EF4-FFF2-40B4-BE49-F238E27FC236}">
+                    <a16:creationId xmlns:a16="http://schemas.microsoft.com/office/drawing/2014/main" id="{2227EEC6-FEF7-41DA-C44F-4CA13A03BA6A}"/>
+                  </a:ext>
+                </a:extLst>
+              </p:cNvPr>
+              <p:cNvCxnSpPr/>
+              <p:nvPr/>
+            </p:nvCxnSpPr>
+            <p:spPr>
+              <a:xfrm>
+                <a:off x="2671240" y="4047574"/>
+                <a:ext cx="180000" cy="0"/>
+              </a:xfrm>
+              <a:prstGeom prst="line">
+                <a:avLst/>
+              </a:prstGeom>
+              <a:ln w="38100">
+                <a:solidFill>
+                  <a:schemeClr val="tx1"/>
+                </a:solidFill>
+              </a:ln>
+            </p:spPr>
+            <p:style>
+              <a:lnRef idx="2">
+                <a:schemeClr val="accent1"/>
+              </a:lnRef>
+              <a:fillRef idx="0">
+                <a:schemeClr val="accent1"/>
+              </a:fillRef>
+              <a:effectRef idx="1">
+                <a:schemeClr val="accent1"/>
+              </a:effectRef>
+              <a:fontRef idx="minor">
+                <a:schemeClr val="tx1"/>
+              </a:fontRef>
+            </p:style>
+          </p:cxnSp>
+          <mc:AlternateContent xmlns:mc="http://schemas.openxmlformats.org/markup-compatibility/2006" xmlns:a14="http://schemas.microsoft.com/office/drawing/2010/main">
+            <mc:Choice Requires="a14">
+              <p:sp>
+                <p:nvSpPr>
+                  <p:cNvPr id="33" name="TextBox 32">
+                    <a:extLst>
+                      <a:ext uri="{FF2B5EF4-FFF2-40B4-BE49-F238E27FC236}">
+                        <a16:creationId xmlns:a16="http://schemas.microsoft.com/office/drawing/2014/main" id="{7E6C4752-480D-BFEC-7961-A01EDECB44A9}"/>
+                      </a:ext>
+                    </a:extLst>
+                  </p:cNvPr>
+                  <p:cNvSpPr txBox="1"/>
+                  <p:nvPr/>
+                </p:nvSpPr>
+                <p:spPr>
+                  <a:xfrm>
+                    <a:off x="1365593" y="3858795"/>
+                    <a:ext cx="895181" cy="391582"/>
+                  </a:xfrm>
+                  <a:prstGeom prst="rect">
+                    <a:avLst/>
+                  </a:prstGeom>
+                  <a:noFill/>
+                </p:spPr>
+                <p:txBody>
+                  <a:bodyPr wrap="none" rtlCol="0">
+                    <a:spAutoFit/>
+                  </a:bodyPr>
+                  <a:lstStyle/>
+                  <a:p>
+                    <a:pPr/>
+                    <a14:m>
+                      <m:oMathPara xmlns:m="http://schemas.openxmlformats.org/officeDocument/2006/math">
+                        <m:oMathParaPr>
+                          <m:jc m:val="centerGroup"/>
+                        </m:oMathParaPr>
+                        <m:oMath xmlns:m="http://schemas.openxmlformats.org/officeDocument/2006/math">
+                          <m:sSub>
+                            <m:sSubPr>
+                              <m:ctrlPr>
+                                <a:rPr lang="nb-NO" b="0" i="1" smtClean="0">
+                                  <a:latin typeface="Cambria Math" panose="02040503050406030204" pitchFamily="18" charset="0"/>
+                                </a:rPr>
+                              </m:ctrlPr>
+                            </m:sSubPr>
+                            <m:e>
+                              <m:r>
+                                <a:rPr lang="nb-NO" b="0" i="1" smtClean="0">
+                                  <a:latin typeface="Cambria Math" panose="02040503050406030204" pitchFamily="18" charset="0"/>
+                                </a:rPr>
+                                <m:t>𝑃𝑜𝑠</m:t>
+                              </m:r>
+                            </m:e>
+                            <m:sub>
+                              <m:r>
+                                <a:rPr lang="nb-NO" b="0" i="1" smtClean="0">
+                                  <a:latin typeface="Cambria Math" panose="02040503050406030204" pitchFamily="18" charset="0"/>
+                                </a:rPr>
+                                <m:t>𝑟𝑒𝑓</m:t>
+                              </m:r>
+                            </m:sub>
+                          </m:sSub>
+                        </m:oMath>
+                      </m:oMathPara>
+                    </a14:m>
+                    <a:endParaRPr lang="en-GB" dirty="0"/>
+                  </a:p>
+                </p:txBody>
+              </p:sp>
+            </mc:Choice>
+            <mc:Fallback xmlns="">
+              <p:sp>
+                <p:nvSpPr>
+                  <p:cNvPr id="33" name="TextBox 32">
+                    <a:extLst>
+                      <a:ext uri="{FF2B5EF4-FFF2-40B4-BE49-F238E27FC236}">
+                        <a16:creationId xmlns:a16="http://schemas.microsoft.com/office/drawing/2014/main" id="{7E6C4752-480D-BFEC-7961-A01EDECB44A9}"/>
+                      </a:ext>
+                    </a:extLst>
+                  </p:cNvPr>
+                  <p:cNvSpPr txBox="1">
+                    <a:spLocks noRot="1" noChangeAspect="1" noMove="1" noResize="1" noEditPoints="1" noAdjustHandles="1" noChangeArrowheads="1" noChangeShapeType="1" noTextEdit="1"/>
+                  </p:cNvSpPr>
+                  <p:nvPr/>
+                </p:nvSpPr>
+                <p:spPr>
+                  <a:xfrm>
+                    <a:off x="1365593" y="3858795"/>
+                    <a:ext cx="895181" cy="391582"/>
+                  </a:xfrm>
+                  <a:prstGeom prst="rect">
+                    <a:avLst/>
+                  </a:prstGeom>
+                  <a:blipFill>
+                    <a:blip r:embed="rId2"/>
+                    <a:stretch>
+                      <a:fillRect b="-9375"/>
+                    </a:stretch>
+                  </a:blipFill>
+                </p:spPr>
+                <p:txBody>
+                  <a:bodyPr/>
+                  <a:lstStyle/>
+                  <a:p>
+                    <a:r>
+                      <a:rPr lang="en-GB">
+                        <a:noFill/>
+                      </a:rPr>
+                      <a:t> </a:t>
+                    </a:r>
+                  </a:p>
+                </p:txBody>
+              </p:sp>
+            </mc:Fallback>
+          </mc:AlternateContent>
+          <mc:AlternateContent xmlns:mc="http://schemas.openxmlformats.org/markup-compatibility/2006" xmlns:a14="http://schemas.microsoft.com/office/drawing/2010/main">
+            <mc:Choice Requires="a14">
+              <p:sp>
+                <p:nvSpPr>
+                  <p:cNvPr id="34" name="TextBox 33">
+                    <a:extLst>
+                      <a:ext uri="{FF2B5EF4-FFF2-40B4-BE49-F238E27FC236}">
+                        <a16:creationId xmlns:a16="http://schemas.microsoft.com/office/drawing/2014/main" id="{1C3CC8F5-8410-9801-4BDC-CF877A7AF017}"/>
+                      </a:ext>
+                    </a:extLst>
+                  </p:cNvPr>
+                  <p:cNvSpPr txBox="1"/>
+                  <p:nvPr/>
+                </p:nvSpPr>
+                <p:spPr>
+                  <a:xfrm>
+                    <a:off x="5059680" y="2757959"/>
+                    <a:ext cx="394339" cy="369332"/>
+                  </a:xfrm>
+                  <a:prstGeom prst="rect">
+                    <a:avLst/>
+                  </a:prstGeom>
+                  <a:noFill/>
+                </p:spPr>
+                <p:txBody>
+                  <a:bodyPr wrap="none" rtlCol="0">
+                    <a:spAutoFit/>
+                  </a:bodyPr>
+                  <a:lstStyle/>
+                  <a:p>
+                    <a:pPr/>
+                    <a14:m>
+                      <m:oMathPara xmlns:m="http://schemas.openxmlformats.org/officeDocument/2006/math">
+                        <m:oMathParaPr>
+                          <m:jc m:val="centerGroup"/>
+                        </m:oMathParaPr>
+                        <m:oMath xmlns:m="http://schemas.openxmlformats.org/officeDocument/2006/math">
+                          <m:r>
+                            <a:rPr lang="nb-NO" b="0" i="1" smtClean="0">
+                              <a:latin typeface="Cambria Math" panose="02040503050406030204" pitchFamily="18" charset="0"/>
+                            </a:rPr>
+                            <m:t>𝑈</m:t>
+                          </m:r>
+                        </m:oMath>
+                      </m:oMathPara>
+                    </a14:m>
+                    <a:endParaRPr lang="en-GB" dirty="0"/>
+                  </a:p>
+                </p:txBody>
+              </p:sp>
+            </mc:Choice>
+            <mc:Fallback xmlns="">
+              <p:sp>
+                <p:nvSpPr>
+                  <p:cNvPr id="34" name="TextBox 33">
+                    <a:extLst>
+                      <a:ext uri="{FF2B5EF4-FFF2-40B4-BE49-F238E27FC236}">
+                        <a16:creationId xmlns:a16="http://schemas.microsoft.com/office/drawing/2014/main" id="{1C3CC8F5-8410-9801-4BDC-CF877A7AF017}"/>
+                      </a:ext>
+                    </a:extLst>
+                  </p:cNvPr>
+                  <p:cNvSpPr txBox="1">
+                    <a:spLocks noRot="1" noChangeAspect="1" noMove="1" noResize="1" noEditPoints="1" noAdjustHandles="1" noChangeArrowheads="1" noChangeShapeType="1" noTextEdit="1"/>
+                  </p:cNvSpPr>
+                  <p:nvPr/>
+                </p:nvSpPr>
+                <p:spPr>
+                  <a:xfrm>
+                    <a:off x="5059680" y="2757959"/>
+                    <a:ext cx="394339" cy="369332"/>
+                  </a:xfrm>
+                  <a:prstGeom prst="rect">
+                    <a:avLst/>
+                  </a:prstGeom>
+                  <a:blipFill>
+                    <a:blip r:embed="rId3"/>
+                    <a:stretch>
+                      <a:fillRect/>
+                    </a:stretch>
+                  </a:blipFill>
+                </p:spPr>
+                <p:txBody>
+                  <a:bodyPr/>
+                  <a:lstStyle/>
+                  <a:p>
+                    <a:r>
+                      <a:rPr lang="en-GB">
+                        <a:noFill/>
+                      </a:rPr>
+                      <a:t> </a:t>
+                    </a:r>
+                  </a:p>
+                </p:txBody>
+              </p:sp>
+            </mc:Fallback>
+          </mc:AlternateContent>
+          <mc:AlternateContent xmlns:mc="http://schemas.openxmlformats.org/markup-compatibility/2006" xmlns:a14="http://schemas.microsoft.com/office/drawing/2010/main">
+            <mc:Choice Requires="a14">
+              <p:sp>
+                <p:nvSpPr>
+                  <p:cNvPr id="53" name="TextBox 52">
+                    <a:extLst>
+                      <a:ext uri="{FF2B5EF4-FFF2-40B4-BE49-F238E27FC236}">
+                        <a16:creationId xmlns:a16="http://schemas.microsoft.com/office/drawing/2014/main" id="{7BB7014E-056F-0BE9-B644-326BC6269B82}"/>
+                      </a:ext>
+                    </a:extLst>
+                  </p:cNvPr>
+                  <p:cNvSpPr txBox="1"/>
+                  <p:nvPr/>
+                </p:nvSpPr>
+                <p:spPr>
+                  <a:xfrm>
+                    <a:off x="2027297" y="2063346"/>
+                    <a:ext cx="857542" cy="391582"/>
+                  </a:xfrm>
+                  <a:prstGeom prst="rect">
+                    <a:avLst/>
+                  </a:prstGeom>
+                  <a:noFill/>
+                </p:spPr>
+                <p:txBody>
+                  <a:bodyPr wrap="none" rtlCol="0">
+                    <a:spAutoFit/>
+                  </a:bodyPr>
+                  <a:lstStyle/>
+                  <a:p>
+                    <a:pPr/>
+                    <a14:m>
+                      <m:oMathPara xmlns:m="http://schemas.openxmlformats.org/officeDocument/2006/math">
+                        <m:oMathParaPr>
+                          <m:jc m:val="centerGroup"/>
+                        </m:oMathParaPr>
+                        <m:oMath xmlns:m="http://schemas.openxmlformats.org/officeDocument/2006/math">
+                          <m:sSub>
+                            <m:sSubPr>
+                              <m:ctrlPr>
+                                <a:rPr lang="nb-NO" b="0" i="1" smtClean="0">
+                                  <a:latin typeface="Cambria Math" panose="02040503050406030204" pitchFamily="18" charset="0"/>
+                                </a:rPr>
+                              </m:ctrlPr>
+                            </m:sSubPr>
+                            <m:e>
+                              <m:r>
+                                <a:rPr lang="nb-NO" b="0" i="1" smtClean="0">
+                                  <a:latin typeface="Cambria Math" panose="02040503050406030204" pitchFamily="18" charset="0"/>
+                                </a:rPr>
+                                <m:t>𝑉𝑒𝑙</m:t>
+                              </m:r>
+                            </m:e>
+                            <m:sub>
+                              <m:r>
+                                <a:rPr lang="nb-NO" b="0" i="1" smtClean="0">
+                                  <a:latin typeface="Cambria Math" panose="02040503050406030204" pitchFamily="18" charset="0"/>
+                                </a:rPr>
+                                <m:t>𝑟𝑒𝑓</m:t>
+                              </m:r>
+                            </m:sub>
+                          </m:sSub>
+                        </m:oMath>
+                      </m:oMathPara>
+                    </a14:m>
+                    <a:endParaRPr lang="en-GB" dirty="0"/>
+                  </a:p>
+                </p:txBody>
+              </p:sp>
+            </mc:Choice>
+            <mc:Fallback xmlns="">
+              <p:sp>
+                <p:nvSpPr>
+                  <p:cNvPr id="53" name="TextBox 52">
+                    <a:extLst>
+                      <a:ext uri="{FF2B5EF4-FFF2-40B4-BE49-F238E27FC236}">
+                        <a16:creationId xmlns:a16="http://schemas.microsoft.com/office/drawing/2014/main" id="{7BB7014E-056F-0BE9-B644-326BC6269B82}"/>
+                      </a:ext>
+                    </a:extLst>
+                  </p:cNvPr>
+                  <p:cNvSpPr txBox="1">
+                    <a:spLocks noRot="1" noChangeAspect="1" noMove="1" noResize="1" noEditPoints="1" noAdjustHandles="1" noChangeArrowheads="1" noChangeShapeType="1" noTextEdit="1"/>
+                  </p:cNvSpPr>
+                  <p:nvPr/>
+                </p:nvSpPr>
+                <p:spPr>
+                  <a:xfrm>
+                    <a:off x="2027297" y="2063346"/>
+                    <a:ext cx="857542" cy="391582"/>
+                  </a:xfrm>
+                  <a:prstGeom prst="rect">
+                    <a:avLst/>
+                  </a:prstGeom>
+                  <a:blipFill>
+                    <a:blip r:embed="rId4"/>
+                    <a:stretch>
+                      <a:fillRect b="-9231"/>
+                    </a:stretch>
+                  </a:blipFill>
+                </p:spPr>
+                <p:txBody>
+                  <a:bodyPr/>
+                  <a:lstStyle/>
+                  <a:p>
+                    <a:r>
+                      <a:rPr lang="en-GB">
+                        <a:noFill/>
+                      </a:rPr>
+                      <a:t> </a:t>
+                    </a:r>
+                  </a:p>
+                </p:txBody>
+              </p:sp>
+            </mc:Fallback>
+          </mc:AlternateContent>
+          <mc:AlternateContent xmlns:mc="http://schemas.openxmlformats.org/markup-compatibility/2006" xmlns:a14="http://schemas.microsoft.com/office/drawing/2010/main">
+            <mc:Choice Requires="a14">
+              <p:sp>
+                <p:nvSpPr>
+                  <p:cNvPr id="56" name="TextBox 55">
+                    <a:extLst>
+                      <a:ext uri="{FF2B5EF4-FFF2-40B4-BE49-F238E27FC236}">
+                        <a16:creationId xmlns:a16="http://schemas.microsoft.com/office/drawing/2014/main" id="{7BCD7082-F1F8-BFC5-6AEC-C6D0973F03A8}"/>
+                      </a:ext>
+                    </a:extLst>
+                  </p:cNvPr>
+                  <p:cNvSpPr txBox="1"/>
+                  <p:nvPr/>
+                </p:nvSpPr>
+                <p:spPr>
+                  <a:xfrm>
+                    <a:off x="1577522" y="5056829"/>
+                    <a:ext cx="960584" cy="369332"/>
+                  </a:xfrm>
+                  <a:prstGeom prst="rect">
+                    <a:avLst/>
+                  </a:prstGeom>
+                  <a:noFill/>
+                </p:spPr>
+                <p:txBody>
+                  <a:bodyPr wrap="none" rtlCol="0">
+                    <a:spAutoFit/>
+                  </a:bodyPr>
+                  <a:lstStyle/>
+                  <a:p>
+                    <a:pPr/>
+                    <a14:m>
+                      <m:oMathPara xmlns:m="http://schemas.openxmlformats.org/officeDocument/2006/math">
+                        <m:oMathParaPr>
+                          <m:jc m:val="centerGroup"/>
+                        </m:oMathParaPr>
+                        <m:oMath xmlns:m="http://schemas.openxmlformats.org/officeDocument/2006/math">
+                          <m:sSub>
+                            <m:sSubPr>
+                              <m:ctrlPr>
+                                <a:rPr lang="nb-NO" b="0" i="1" smtClean="0">
+                                  <a:latin typeface="Cambria Math" panose="02040503050406030204" pitchFamily="18" charset="0"/>
+                                </a:rPr>
+                              </m:ctrlPr>
+                            </m:sSubPr>
+                            <m:e>
+                              <m:r>
+                                <a:rPr lang="nb-NO" b="0" i="1" smtClean="0">
+                                  <a:latin typeface="Cambria Math" panose="02040503050406030204" pitchFamily="18" charset="0"/>
+                                </a:rPr>
+                                <m:t>𝑃𝑜𝑠</m:t>
+                              </m:r>
+                            </m:e>
+                            <m:sub>
+                              <m:r>
+                                <a:rPr lang="nb-NO" b="0" i="1" smtClean="0">
+                                  <a:latin typeface="Cambria Math" panose="02040503050406030204" pitchFamily="18" charset="0"/>
+                                </a:rPr>
+                                <m:t>𝑟𝑒𝑎𝑙</m:t>
+                              </m:r>
+                            </m:sub>
+                          </m:sSub>
+                        </m:oMath>
+                      </m:oMathPara>
+                    </a14:m>
+                    <a:endParaRPr lang="en-GB" dirty="0"/>
+                  </a:p>
+                </p:txBody>
+              </p:sp>
+            </mc:Choice>
+            <mc:Fallback xmlns="">
+              <p:sp>
+                <p:nvSpPr>
+                  <p:cNvPr id="56" name="TextBox 55">
+                    <a:extLst>
+                      <a:ext uri="{FF2B5EF4-FFF2-40B4-BE49-F238E27FC236}">
+                        <a16:creationId xmlns:a16="http://schemas.microsoft.com/office/drawing/2014/main" id="{7BCD7082-F1F8-BFC5-6AEC-C6D0973F03A8}"/>
+                      </a:ext>
+                    </a:extLst>
+                  </p:cNvPr>
+                  <p:cNvSpPr txBox="1">
+                    <a:spLocks noRot="1" noChangeAspect="1" noMove="1" noResize="1" noEditPoints="1" noAdjustHandles="1" noChangeArrowheads="1" noChangeShapeType="1" noTextEdit="1"/>
+                  </p:cNvSpPr>
+                  <p:nvPr/>
+                </p:nvSpPr>
+                <p:spPr>
+                  <a:xfrm>
+                    <a:off x="1577522" y="5056829"/>
+                    <a:ext cx="960584" cy="369332"/>
+                  </a:xfrm>
+                  <a:prstGeom prst="rect">
+                    <a:avLst/>
+                  </a:prstGeom>
+                  <a:blipFill>
+                    <a:blip r:embed="rId5"/>
+                    <a:stretch>
+                      <a:fillRect/>
+                    </a:stretch>
+                  </a:blipFill>
+                </p:spPr>
+                <p:txBody>
+                  <a:bodyPr/>
+                  <a:lstStyle/>
+                  <a:p>
+                    <a:r>
+                      <a:rPr lang="en-GB">
+                        <a:noFill/>
+                      </a:rPr>
+                      <a:t> </a:t>
+                    </a:r>
+                  </a:p>
+                </p:txBody>
+              </p:sp>
+            </mc:Fallback>
+          </mc:AlternateContent>
+          <mc:AlternateContent xmlns:mc="http://schemas.openxmlformats.org/markup-compatibility/2006" xmlns:a14="http://schemas.microsoft.com/office/drawing/2010/main">
+            <mc:Choice Requires="a14">
+              <p:sp>
+                <p:nvSpPr>
+                  <p:cNvPr id="57" name="TextBox 56">
+                    <a:extLst>
+                      <a:ext uri="{FF2B5EF4-FFF2-40B4-BE49-F238E27FC236}">
+                        <a16:creationId xmlns:a16="http://schemas.microsoft.com/office/drawing/2014/main" id="{44E9C302-B0B7-1846-C44D-E16B9F668377}"/>
+                      </a:ext>
+                    </a:extLst>
+                  </p:cNvPr>
+                  <p:cNvSpPr txBox="1"/>
+                  <p:nvPr/>
+                </p:nvSpPr>
+                <p:spPr>
+                  <a:xfrm>
+                    <a:off x="2594578" y="3423290"/>
+                    <a:ext cx="1089978" cy="369332"/>
+                  </a:xfrm>
+                  <a:prstGeom prst="rect">
+                    <a:avLst/>
+                  </a:prstGeom>
+                  <a:noFill/>
+                </p:spPr>
+                <p:txBody>
+                  <a:bodyPr wrap="none" rtlCol="0">
+                    <a:spAutoFit/>
+                  </a:bodyPr>
+                  <a:lstStyle/>
+                  <a:p>
+                    <a:pPr/>
+                    <a14:m>
+                      <m:oMathPara xmlns:m="http://schemas.openxmlformats.org/officeDocument/2006/math">
+                        <m:oMathParaPr>
+                          <m:jc m:val="centerGroup"/>
+                        </m:oMathParaPr>
+                        <m:oMath xmlns:m="http://schemas.openxmlformats.org/officeDocument/2006/math">
+                          <m:sSub>
+                            <m:sSubPr>
+                              <m:ctrlPr>
+                                <a:rPr lang="nb-NO" b="0" i="1" smtClean="0">
+                                  <a:latin typeface="Cambria Math" panose="02040503050406030204" pitchFamily="18" charset="0"/>
+                                </a:rPr>
+                              </m:ctrlPr>
+                            </m:sSubPr>
+                            <m:e>
+                              <m:r>
+                                <a:rPr lang="nb-NO" b="0" i="1" smtClean="0">
+                                  <a:latin typeface="Cambria Math" panose="02040503050406030204" pitchFamily="18" charset="0"/>
+                                </a:rPr>
+                                <m:t>𝑃𝑜𝑠</m:t>
+                              </m:r>
+                            </m:e>
+                            <m:sub>
+                              <m:r>
+                                <a:rPr lang="nb-NO" b="0" i="1" smtClean="0">
+                                  <a:latin typeface="Cambria Math" panose="02040503050406030204" pitchFamily="18" charset="0"/>
+                                </a:rPr>
+                                <m:t>𝐸𝑟𝑟𝑜𝑟</m:t>
+                              </m:r>
+                            </m:sub>
+                          </m:sSub>
+                        </m:oMath>
+                      </m:oMathPara>
+                    </a14:m>
+                    <a:endParaRPr lang="en-GB" dirty="0"/>
+                  </a:p>
+                </p:txBody>
+              </p:sp>
+            </mc:Choice>
+            <mc:Fallback xmlns="">
+              <p:sp>
+                <p:nvSpPr>
+                  <p:cNvPr id="57" name="TextBox 56">
+                    <a:extLst>
+                      <a:ext uri="{FF2B5EF4-FFF2-40B4-BE49-F238E27FC236}">
+                        <a16:creationId xmlns:a16="http://schemas.microsoft.com/office/drawing/2014/main" id="{44E9C302-B0B7-1846-C44D-E16B9F668377}"/>
+                      </a:ext>
+                    </a:extLst>
+                  </p:cNvPr>
+                  <p:cNvSpPr txBox="1">
+                    <a:spLocks noRot="1" noChangeAspect="1" noMove="1" noResize="1" noEditPoints="1" noAdjustHandles="1" noChangeArrowheads="1" noChangeShapeType="1" noTextEdit="1"/>
+                  </p:cNvSpPr>
+                  <p:nvPr/>
+                </p:nvSpPr>
+                <p:spPr>
+                  <a:xfrm>
+                    <a:off x="2594578" y="3423290"/>
+                    <a:ext cx="1089978" cy="369332"/>
+                  </a:xfrm>
+                  <a:prstGeom prst="rect">
+                    <a:avLst/>
+                  </a:prstGeom>
+                  <a:blipFill>
+                    <a:blip r:embed="rId6"/>
+                    <a:stretch>
+                      <a:fillRect/>
+                    </a:stretch>
+                  </a:blipFill>
+                </p:spPr>
+                <p:txBody>
+                  <a:bodyPr/>
+                  <a:lstStyle/>
+                  <a:p>
+                    <a:r>
+                      <a:rPr lang="en-GB">
+                        <a:noFill/>
+                      </a:rPr>
+                      <a:t> </a:t>
+                    </a:r>
+                  </a:p>
+                </p:txBody>
+              </p:sp>
+            </mc:Fallback>
+          </mc:AlternateContent>
+        </p:grpSp>
+        <p:cxnSp>
+          <p:nvCxnSpPr>
+            <p:cNvPr id="84" name="Connector: Elbow 83">
+              <a:extLst>
+                <a:ext uri="{FF2B5EF4-FFF2-40B4-BE49-F238E27FC236}">
+                  <a16:creationId xmlns:a16="http://schemas.microsoft.com/office/drawing/2014/main" id="{E91669A2-CDA3-C4EF-D565-BA815EA0FB1E}"/>
+                </a:ext>
+              </a:extLst>
+            </p:cNvPr>
+            <p:cNvCxnSpPr>
+              <a:cxnSpLocks/>
+              <a:stCxn id="5" idx="2"/>
+              <a:endCxn id="4" idx="0"/>
+            </p:cNvCxnSpPr>
+            <p:nvPr/>
+          </p:nvCxnSpPr>
+          <p:spPr>
+            <a:xfrm rot="5400000" flipH="1" flipV="1">
+              <a:off x="1730255" y="3958143"/>
+              <a:ext cx="3818482" cy="407701"/>
+            </a:xfrm>
+            <a:prstGeom prst="bentConnector5">
+              <a:avLst>
+                <a:gd name="adj1" fmla="val -5987"/>
+                <a:gd name="adj2" fmla="val 570097"/>
+                <a:gd name="adj3" fmla="val 105987"/>
+              </a:avLst>
+            </a:prstGeom>
+            <a:ln w="38100">
+              <a:tailEnd type="triangle"/>
+            </a:ln>
+          </p:spPr>
+          <p:style>
+            <a:lnRef idx="2">
+              <a:schemeClr val="accent1"/>
+            </a:lnRef>
+            <a:fillRef idx="0">
+              <a:schemeClr val="accent1"/>
+            </a:fillRef>
+            <a:effectRef idx="1">
+              <a:schemeClr val="accent1"/>
+            </a:effectRef>
+            <a:fontRef idx="minor">
+              <a:schemeClr val="tx1"/>
+            </a:fontRef>
+          </p:style>
+        </p:cxnSp>
+        <mc:AlternateContent xmlns:mc="http://schemas.openxmlformats.org/markup-compatibility/2006">
+          <mc:Choice xmlns:a14="http://schemas.microsoft.com/office/drawing/2010/main" Requires="a14">
+            <p:sp>
+              <p:nvSpPr>
+                <p:cNvPr id="89" name="TextBox 88">
+                  <a:extLst>
+                    <a:ext uri="{FF2B5EF4-FFF2-40B4-BE49-F238E27FC236}">
+                      <a16:creationId xmlns:a16="http://schemas.microsoft.com/office/drawing/2014/main" id="{F5C993C9-88D8-DF8C-B03A-47BEED71BB02}"/>
+                    </a:ext>
+                  </a:extLst>
+                </p:cNvPr>
+                <p:cNvSpPr txBox="1"/>
+                <p:nvPr/>
+              </p:nvSpPr>
+              <p:spPr>
+                <a:xfrm>
+                  <a:off x="3400959" y="6270589"/>
+                  <a:ext cx="2359171" cy="369332"/>
+                </a:xfrm>
+                <a:prstGeom prst="rect">
+                  <a:avLst/>
+                </a:prstGeom>
+                <a:noFill/>
+              </p:spPr>
+              <p:txBody>
+                <a:bodyPr wrap="none" rtlCol="0">
+                  <a:spAutoFit/>
+                </a:bodyPr>
+                <a:lstStyle/>
+                <a:p>
+                  <a:pPr/>
+                  <a14:m>
+                    <m:oMathPara xmlns:m="http://schemas.openxmlformats.org/officeDocument/2006/math">
+                      <m:oMathParaPr>
+                        <m:jc m:val="centerGroup"/>
+                      </m:oMathParaPr>
+                      <m:oMath xmlns:m="http://schemas.openxmlformats.org/officeDocument/2006/math">
+                        <m:r>
+                          <a:rPr lang="nb-NO" b="0" i="1" smtClean="0">
+                            <a:latin typeface="Cambria Math" panose="02040503050406030204" pitchFamily="18" charset="0"/>
+                          </a:rPr>
+                          <m:t>𝑀𝑒𝑎𝑠𝑢𝑟𝑒𝑑</m:t>
+                        </m:r>
+                        <m:r>
+                          <a:rPr lang="nb-NO" b="0" i="1" smtClean="0">
+                            <a:latin typeface="Cambria Math" panose="02040503050406030204" pitchFamily="18" charset="0"/>
+                          </a:rPr>
+                          <m:t> </m:t>
+                        </m:r>
+                        <m:r>
+                          <a:rPr lang="nb-NO" b="0" i="1" smtClean="0">
+                            <a:latin typeface="Cambria Math" panose="02040503050406030204" pitchFamily="18" charset="0"/>
+                          </a:rPr>
+                          <m:t>𝑝𝑟𝑒𝑠𝑠𝑢𝑟𝑒𝑠</m:t>
+                        </m:r>
+                      </m:oMath>
+                    </m:oMathPara>
+                  </a14:m>
+                  <a:endParaRPr lang="en-GB" dirty="0"/>
+                </a:p>
+              </p:txBody>
+            </p:sp>
+          </mc:Choice>
+          <mc:Fallback>
+            <p:sp>
+              <p:nvSpPr>
+                <p:cNvPr id="89" name="TextBox 88">
+                  <a:extLst>
+                    <a:ext uri="{FF2B5EF4-FFF2-40B4-BE49-F238E27FC236}">
+                      <a16:creationId xmlns:a16="http://schemas.microsoft.com/office/drawing/2014/main" id="{F5C993C9-88D8-DF8C-B03A-47BEED71BB02}"/>
+                    </a:ext>
+                  </a:extLst>
+                </p:cNvPr>
+                <p:cNvSpPr txBox="1">
+                  <a:spLocks noRot="1" noChangeAspect="1" noMove="1" noResize="1" noEditPoints="1" noAdjustHandles="1" noChangeArrowheads="1" noChangeShapeType="1" noTextEdit="1"/>
+                </p:cNvSpPr>
+                <p:nvPr/>
+              </p:nvSpPr>
+              <p:spPr>
+                <a:xfrm>
+                  <a:off x="3400959" y="6270589"/>
+                  <a:ext cx="2359171" cy="369332"/>
+                </a:xfrm>
+                <a:prstGeom prst="rect">
+                  <a:avLst/>
+                </a:prstGeom>
+                <a:blipFill>
+                  <a:blip r:embed="rId13"/>
+                  <a:stretch>
+                    <a:fillRect b="-6667"/>
+                  </a:stretch>
+                </a:blipFill>
+              </p:spPr>
+              <p:txBody>
+                <a:bodyPr/>
+                <a:lstStyle/>
+                <a:p>
+                  <a:r>
+                    <a:rPr lang="en-GB">
+                      <a:noFill/>
+                    </a:rPr>
+                    <a:t> </a:t>
+                  </a:r>
+                </a:p>
+              </p:txBody>
+            </p:sp>
+          </mc:Fallback>
+        </mc:AlternateContent>
+      </p:grpSp>
     </p:spTree>
     <p:extLst>
       <p:ext uri="{BB962C8B-B14F-4D97-AF65-F5344CB8AC3E}">

</xml_diff>